<commit_message>
Steps 1-3 is reviwed
</commit_message>
<xml_diff>
--- a/Step02-CICD_presentation.pptx
+++ b/Step02-CICD_presentation.pptx
@@ -453,927 +453,6 @@
             <pc:docMk/>
             <pc:sldMasterMk cId="1579723609" sldId="2147483660"/>
             <pc:sldLayoutMk cId="1498987355" sldId="2147483662"/>
-          </pc:sldLayoutMkLst>
-        </pc:sldLayoutChg>
-      </pc:sldMasterChg>
-    </pc:docChg>
-  </pc:docChgLst>
-  <pc:docChgLst>
-    <pc:chgData name="Ihor Aleksandrov" userId="c3051032-6b87-4db2-b257-777a0106fbd9" providerId="ADAL" clId="{D05EAF56-C8F0-4612-806C-93E1C27F1929}"/>
-    <pc:docChg chg="undo redo custSel addSld delSld modSld sldOrd addMainMaster addSection modSection">
-      <pc:chgData name="Ihor Aleksandrov" userId="c3051032-6b87-4db2-b257-777a0106fbd9" providerId="ADAL" clId="{D05EAF56-C8F0-4612-806C-93E1C27F1929}" dt="2024-01-25T12:18:42.706" v="325"/>
-      <pc:docMkLst>
-        <pc:docMk/>
-      </pc:docMkLst>
-      <pc:sldChg chg="addSp modSp mod setBg">
-        <pc:chgData name="Ihor Aleksandrov" userId="c3051032-6b87-4db2-b257-777a0106fbd9" providerId="ADAL" clId="{D05EAF56-C8F0-4612-806C-93E1C27F1929}" dt="2024-01-25T09:34:46.181" v="0" actId="26606"/>
-        <pc:sldMkLst>
-          <pc:docMk/>
-          <pc:sldMk cId="552267186" sldId="256"/>
-        </pc:sldMkLst>
-        <pc:spChg chg="mod">
-          <ac:chgData name="Ihor Aleksandrov" userId="c3051032-6b87-4db2-b257-777a0106fbd9" providerId="ADAL" clId="{D05EAF56-C8F0-4612-806C-93E1C27F1929}" dt="2024-01-25T09:34:46.181" v="0" actId="26606"/>
-          <ac:spMkLst>
-            <pc:docMk/>
-            <pc:sldMk cId="552267186" sldId="256"/>
-            <ac:spMk id="2" creationId="{18C18207-A109-5552-1541-0ABBAA316282}"/>
-          </ac:spMkLst>
-        </pc:spChg>
-        <pc:spChg chg="mod">
-          <ac:chgData name="Ihor Aleksandrov" userId="c3051032-6b87-4db2-b257-777a0106fbd9" providerId="ADAL" clId="{D05EAF56-C8F0-4612-806C-93E1C27F1929}" dt="2024-01-25T09:34:46.181" v="0" actId="26606"/>
-          <ac:spMkLst>
-            <pc:docMk/>
-            <pc:sldMk cId="552267186" sldId="256"/>
-            <ac:spMk id="3" creationId="{3473E1D3-7401-AD94-5C7A-49912FA8005A}"/>
-          </ac:spMkLst>
-        </pc:spChg>
-        <pc:spChg chg="mod">
-          <ac:chgData name="Ihor Aleksandrov" userId="c3051032-6b87-4db2-b257-777a0106fbd9" providerId="ADAL" clId="{D05EAF56-C8F0-4612-806C-93E1C27F1929}" dt="2024-01-25T09:34:46.181" v="0" actId="26606"/>
-          <ac:spMkLst>
-            <pc:docMk/>
-            <pc:sldMk cId="552267186" sldId="256"/>
-            <ac:spMk id="4" creationId="{C99D0D71-05C2-1881-DCFB-D99C1C10CBB8}"/>
-          </ac:spMkLst>
-        </pc:spChg>
-        <pc:spChg chg="add">
-          <ac:chgData name="Ihor Aleksandrov" userId="c3051032-6b87-4db2-b257-777a0106fbd9" providerId="ADAL" clId="{D05EAF56-C8F0-4612-806C-93E1C27F1929}" dt="2024-01-25T09:34:46.181" v="0" actId="26606"/>
-          <ac:spMkLst>
-            <pc:docMk/>
-            <pc:sldMk cId="552267186" sldId="256"/>
-            <ac:spMk id="9" creationId="{C3896A03-3945-419A-B66B-4EE266EDD152}"/>
-          </ac:spMkLst>
-        </pc:spChg>
-        <pc:spChg chg="add">
-          <ac:chgData name="Ihor Aleksandrov" userId="c3051032-6b87-4db2-b257-777a0106fbd9" providerId="ADAL" clId="{D05EAF56-C8F0-4612-806C-93E1C27F1929}" dt="2024-01-25T09:34:46.181" v="0" actId="26606"/>
-          <ac:spMkLst>
-            <pc:docMk/>
-            <pc:sldMk cId="552267186" sldId="256"/>
-            <ac:spMk id="11" creationId="{B34F5AD2-EDBD-4BBD-A55C-EAFFD0C7097A}"/>
-          </ac:spMkLst>
-        </pc:spChg>
-      </pc:sldChg>
-      <pc:sldChg chg="modSp mod">
-        <pc:chgData name="Ihor Aleksandrov" userId="c3051032-6b87-4db2-b257-777a0106fbd9" providerId="ADAL" clId="{D05EAF56-C8F0-4612-806C-93E1C27F1929}" dt="2024-01-25T11:00:29.329" v="160"/>
-        <pc:sldMkLst>
-          <pc:docMk/>
-          <pc:sldMk cId="3569579791" sldId="265"/>
-        </pc:sldMkLst>
-        <pc:spChg chg="mod">
-          <ac:chgData name="Ihor Aleksandrov" userId="c3051032-6b87-4db2-b257-777a0106fbd9" providerId="ADAL" clId="{D05EAF56-C8F0-4612-806C-93E1C27F1929}" dt="2024-01-25T11:00:29.329" v="160"/>
-          <ac:spMkLst>
-            <pc:docMk/>
-            <pc:sldMk cId="3569579791" sldId="265"/>
-            <ac:spMk id="2" creationId="{53C5D828-9666-E312-B574-9FE965A7D6BE}"/>
-          </ac:spMkLst>
-        </pc:spChg>
-      </pc:sldChg>
-      <pc:sldChg chg="addSp delSp modSp add mod">
-        <pc:chgData name="Ihor Aleksandrov" userId="c3051032-6b87-4db2-b257-777a0106fbd9" providerId="ADAL" clId="{D05EAF56-C8F0-4612-806C-93E1C27F1929}" dt="2024-01-25T10:19:44.220" v="11" actId="1076"/>
-        <pc:sldMkLst>
-          <pc:docMk/>
-          <pc:sldMk cId="3985704815" sldId="270"/>
-        </pc:sldMkLst>
-        <pc:spChg chg="mod">
-          <ac:chgData name="Ihor Aleksandrov" userId="c3051032-6b87-4db2-b257-777a0106fbd9" providerId="ADAL" clId="{D05EAF56-C8F0-4612-806C-93E1C27F1929}" dt="2024-01-25T10:19:15.861" v="6"/>
-          <ac:spMkLst>
-            <pc:docMk/>
-            <pc:sldMk cId="3985704815" sldId="270"/>
-            <ac:spMk id="2" creationId="{53C5D828-9666-E312-B574-9FE965A7D6BE}"/>
-          </ac:spMkLst>
-        </pc:spChg>
-        <pc:picChg chg="add mod">
-          <ac:chgData name="Ihor Aleksandrov" userId="c3051032-6b87-4db2-b257-777a0106fbd9" providerId="ADAL" clId="{D05EAF56-C8F0-4612-806C-93E1C27F1929}" dt="2024-01-25T10:19:44.220" v="11" actId="1076"/>
-          <ac:picMkLst>
-            <pc:docMk/>
-            <pc:sldMk cId="3985704815" sldId="270"/>
-            <ac:picMk id="5" creationId="{329D80B6-A19C-F87F-FE85-78E58BE79DFC}"/>
-          </ac:picMkLst>
-        </pc:picChg>
-        <pc:picChg chg="del">
-          <ac:chgData name="Ihor Aleksandrov" userId="c3051032-6b87-4db2-b257-777a0106fbd9" providerId="ADAL" clId="{D05EAF56-C8F0-4612-806C-93E1C27F1929}" dt="2024-01-25T10:19:18.657" v="7" actId="478"/>
-          <ac:picMkLst>
-            <pc:docMk/>
-            <pc:sldMk cId="3985704815" sldId="270"/>
-            <ac:picMk id="6" creationId="{BDB4DD57-1DD7-48B1-ABFB-EE3016703034}"/>
-          </ac:picMkLst>
-        </pc:picChg>
-      </pc:sldChg>
-      <pc:sldChg chg="addSp delSp modSp add mod">
-        <pc:chgData name="Ihor Aleksandrov" userId="c3051032-6b87-4db2-b257-777a0106fbd9" providerId="ADAL" clId="{D05EAF56-C8F0-4612-806C-93E1C27F1929}" dt="2024-01-25T10:21:34.770" v="23" actId="1076"/>
-        <pc:sldMkLst>
-          <pc:docMk/>
-          <pc:sldMk cId="2117969225" sldId="271"/>
-        </pc:sldMkLst>
-        <pc:spChg chg="mod">
-          <ac:chgData name="Ihor Aleksandrov" userId="c3051032-6b87-4db2-b257-777a0106fbd9" providerId="ADAL" clId="{D05EAF56-C8F0-4612-806C-93E1C27F1929}" dt="2024-01-25T10:20:53.128" v="15"/>
-          <ac:spMkLst>
-            <pc:docMk/>
-            <pc:sldMk cId="2117969225" sldId="271"/>
-            <ac:spMk id="2" creationId="{53C5D828-9666-E312-B574-9FE965A7D6BE}"/>
-          </ac:spMkLst>
-        </pc:spChg>
-        <pc:picChg chg="del">
-          <ac:chgData name="Ihor Aleksandrov" userId="c3051032-6b87-4db2-b257-777a0106fbd9" providerId="ADAL" clId="{D05EAF56-C8F0-4612-806C-93E1C27F1929}" dt="2024-01-25T10:21:32.921" v="22" actId="478"/>
-          <ac:picMkLst>
-            <pc:docMk/>
-            <pc:sldMk cId="2117969225" sldId="271"/>
-            <ac:picMk id="5" creationId="{329D80B6-A19C-F87F-FE85-78E58BE79DFC}"/>
-          </ac:picMkLst>
-        </pc:picChg>
-        <pc:picChg chg="add mod">
-          <ac:chgData name="Ihor Aleksandrov" userId="c3051032-6b87-4db2-b257-777a0106fbd9" providerId="ADAL" clId="{D05EAF56-C8F0-4612-806C-93E1C27F1929}" dt="2024-01-25T10:21:34.770" v="23" actId="1076"/>
-          <ac:picMkLst>
-            <pc:docMk/>
-            <pc:sldMk cId="2117969225" sldId="271"/>
-            <ac:picMk id="6" creationId="{4FAB23B6-5773-62B9-EF9A-E1E0562BE8E1}"/>
-          </ac:picMkLst>
-        </pc:picChg>
-      </pc:sldChg>
-      <pc:sldChg chg="addSp delSp modSp add mod">
-        <pc:chgData name="Ihor Aleksandrov" userId="c3051032-6b87-4db2-b257-777a0106fbd9" providerId="ADAL" clId="{D05EAF56-C8F0-4612-806C-93E1C27F1929}" dt="2024-01-25T10:22:58.698" v="32" actId="1076"/>
-        <pc:sldMkLst>
-          <pc:docMk/>
-          <pc:sldMk cId="1169417950" sldId="272"/>
-        </pc:sldMkLst>
-        <pc:spChg chg="mod">
-          <ac:chgData name="Ihor Aleksandrov" userId="c3051032-6b87-4db2-b257-777a0106fbd9" providerId="ADAL" clId="{D05EAF56-C8F0-4612-806C-93E1C27F1929}" dt="2024-01-25T10:22:37.334" v="27"/>
-          <ac:spMkLst>
-            <pc:docMk/>
-            <pc:sldMk cId="1169417950" sldId="272"/>
-            <ac:spMk id="2" creationId="{53C5D828-9666-E312-B574-9FE965A7D6BE}"/>
-          </ac:spMkLst>
-        </pc:spChg>
-        <pc:picChg chg="add mod">
-          <ac:chgData name="Ihor Aleksandrov" userId="c3051032-6b87-4db2-b257-777a0106fbd9" providerId="ADAL" clId="{D05EAF56-C8F0-4612-806C-93E1C27F1929}" dt="2024-01-25T10:22:58.698" v="32" actId="1076"/>
-          <ac:picMkLst>
-            <pc:docMk/>
-            <pc:sldMk cId="1169417950" sldId="272"/>
-            <ac:picMk id="5" creationId="{2673936C-DF0C-E6AF-ABCB-83A1EB8FE594}"/>
-          </ac:picMkLst>
-        </pc:picChg>
-        <pc:picChg chg="del">
-          <ac:chgData name="Ihor Aleksandrov" userId="c3051032-6b87-4db2-b257-777a0106fbd9" providerId="ADAL" clId="{D05EAF56-C8F0-4612-806C-93E1C27F1929}" dt="2024-01-25T10:22:48.916" v="28" actId="478"/>
-          <ac:picMkLst>
-            <pc:docMk/>
-            <pc:sldMk cId="1169417950" sldId="272"/>
-            <ac:picMk id="6" creationId="{4FAB23B6-5773-62B9-EF9A-E1E0562BE8E1}"/>
-          </ac:picMkLst>
-        </pc:picChg>
-      </pc:sldChg>
-      <pc:sldChg chg="addSp delSp modSp add mod">
-        <pc:chgData name="Ihor Aleksandrov" userId="c3051032-6b87-4db2-b257-777a0106fbd9" providerId="ADAL" clId="{D05EAF56-C8F0-4612-806C-93E1C27F1929}" dt="2024-01-25T10:24:25.717" v="41" actId="1076"/>
-        <pc:sldMkLst>
-          <pc:docMk/>
-          <pc:sldMk cId="22639359" sldId="273"/>
-        </pc:sldMkLst>
-        <pc:spChg chg="mod">
-          <ac:chgData name="Ihor Aleksandrov" userId="c3051032-6b87-4db2-b257-777a0106fbd9" providerId="ADAL" clId="{D05EAF56-C8F0-4612-806C-93E1C27F1929}" dt="2024-01-25T10:24:04.948" v="36"/>
-          <ac:spMkLst>
-            <pc:docMk/>
-            <pc:sldMk cId="22639359" sldId="273"/>
-            <ac:spMk id="2" creationId="{53C5D828-9666-E312-B574-9FE965A7D6BE}"/>
-          </ac:spMkLst>
-        </pc:spChg>
-        <pc:picChg chg="del">
-          <ac:chgData name="Ihor Aleksandrov" userId="c3051032-6b87-4db2-b257-777a0106fbd9" providerId="ADAL" clId="{D05EAF56-C8F0-4612-806C-93E1C27F1929}" dt="2024-01-25T10:24:16.672" v="37" actId="478"/>
-          <ac:picMkLst>
-            <pc:docMk/>
-            <pc:sldMk cId="22639359" sldId="273"/>
-            <ac:picMk id="5" creationId="{2673936C-DF0C-E6AF-ABCB-83A1EB8FE594}"/>
-          </ac:picMkLst>
-        </pc:picChg>
-        <pc:picChg chg="add mod">
-          <ac:chgData name="Ihor Aleksandrov" userId="c3051032-6b87-4db2-b257-777a0106fbd9" providerId="ADAL" clId="{D05EAF56-C8F0-4612-806C-93E1C27F1929}" dt="2024-01-25T10:24:25.717" v="41" actId="1076"/>
-          <ac:picMkLst>
-            <pc:docMk/>
-            <pc:sldMk cId="22639359" sldId="273"/>
-            <ac:picMk id="6" creationId="{F57DB18D-BCA3-CA46-401F-99D6D9BB7754}"/>
-          </ac:picMkLst>
-        </pc:picChg>
-      </pc:sldChg>
-      <pc:sldChg chg="addSp delSp modSp add mod">
-        <pc:chgData name="Ihor Aleksandrov" userId="c3051032-6b87-4db2-b257-777a0106fbd9" providerId="ADAL" clId="{D05EAF56-C8F0-4612-806C-93E1C27F1929}" dt="2024-01-25T10:26:48.038" v="50" actId="1076"/>
-        <pc:sldMkLst>
-          <pc:docMk/>
-          <pc:sldMk cId="2169937468" sldId="274"/>
-        </pc:sldMkLst>
-        <pc:spChg chg="mod">
-          <ac:chgData name="Ihor Aleksandrov" userId="c3051032-6b87-4db2-b257-777a0106fbd9" providerId="ADAL" clId="{D05EAF56-C8F0-4612-806C-93E1C27F1929}" dt="2024-01-25T10:26:26.621" v="45"/>
-          <ac:spMkLst>
-            <pc:docMk/>
-            <pc:sldMk cId="2169937468" sldId="274"/>
-            <ac:spMk id="2" creationId="{53C5D828-9666-E312-B574-9FE965A7D6BE}"/>
-          </ac:spMkLst>
-        </pc:spChg>
-        <pc:picChg chg="add mod">
-          <ac:chgData name="Ihor Aleksandrov" userId="c3051032-6b87-4db2-b257-777a0106fbd9" providerId="ADAL" clId="{D05EAF56-C8F0-4612-806C-93E1C27F1929}" dt="2024-01-25T10:26:48.038" v="50" actId="1076"/>
-          <ac:picMkLst>
-            <pc:docMk/>
-            <pc:sldMk cId="2169937468" sldId="274"/>
-            <ac:picMk id="5" creationId="{9A572A88-7842-99D5-9802-EEA8606516CC}"/>
-          </ac:picMkLst>
-        </pc:picChg>
-        <pc:picChg chg="del">
-          <ac:chgData name="Ihor Aleksandrov" userId="c3051032-6b87-4db2-b257-777a0106fbd9" providerId="ADAL" clId="{D05EAF56-C8F0-4612-806C-93E1C27F1929}" dt="2024-01-25T10:26:41.517" v="48" actId="478"/>
-          <ac:picMkLst>
-            <pc:docMk/>
-            <pc:sldMk cId="2169937468" sldId="274"/>
-            <ac:picMk id="6" creationId="{F57DB18D-BCA3-CA46-401F-99D6D9BB7754}"/>
-          </ac:picMkLst>
-        </pc:picChg>
-      </pc:sldChg>
-      <pc:sldChg chg="addSp delSp modSp add mod">
-        <pc:chgData name="Ihor Aleksandrov" userId="c3051032-6b87-4db2-b257-777a0106fbd9" providerId="ADAL" clId="{D05EAF56-C8F0-4612-806C-93E1C27F1929}" dt="2024-01-25T10:28:26.836" v="62" actId="1076"/>
-        <pc:sldMkLst>
-          <pc:docMk/>
-          <pc:sldMk cId="3976992233" sldId="275"/>
-        </pc:sldMkLst>
-        <pc:spChg chg="mod">
-          <ac:chgData name="Ihor Aleksandrov" userId="c3051032-6b87-4db2-b257-777a0106fbd9" providerId="ADAL" clId="{D05EAF56-C8F0-4612-806C-93E1C27F1929}" dt="2024-01-25T10:28:02.805" v="55" actId="27636"/>
-          <ac:spMkLst>
-            <pc:docMk/>
-            <pc:sldMk cId="3976992233" sldId="275"/>
-            <ac:spMk id="2" creationId="{53C5D828-9666-E312-B574-9FE965A7D6BE}"/>
-          </ac:spMkLst>
-        </pc:spChg>
-        <pc:picChg chg="del">
-          <ac:chgData name="Ihor Aleksandrov" userId="c3051032-6b87-4db2-b257-777a0106fbd9" providerId="ADAL" clId="{D05EAF56-C8F0-4612-806C-93E1C27F1929}" dt="2024-01-25T10:28:04.538" v="56" actId="478"/>
-          <ac:picMkLst>
-            <pc:docMk/>
-            <pc:sldMk cId="3976992233" sldId="275"/>
-            <ac:picMk id="5" creationId="{9A572A88-7842-99D5-9802-EEA8606516CC}"/>
-          </ac:picMkLst>
-        </pc:picChg>
-        <pc:picChg chg="add mod">
-          <ac:chgData name="Ihor Aleksandrov" userId="c3051032-6b87-4db2-b257-777a0106fbd9" providerId="ADAL" clId="{D05EAF56-C8F0-4612-806C-93E1C27F1929}" dt="2024-01-25T10:28:26.836" v="62" actId="1076"/>
-          <ac:picMkLst>
-            <pc:docMk/>
-            <pc:sldMk cId="3976992233" sldId="275"/>
-            <ac:picMk id="6" creationId="{76FE2D85-671A-24B1-C1D7-52F796E16C69}"/>
-          </ac:picMkLst>
-        </pc:picChg>
-      </pc:sldChg>
-      <pc:sldChg chg="addSp delSp modSp add mod ord">
-        <pc:chgData name="Ihor Aleksandrov" userId="c3051032-6b87-4db2-b257-777a0106fbd9" providerId="ADAL" clId="{D05EAF56-C8F0-4612-806C-93E1C27F1929}" dt="2024-01-25T10:48:12.411" v="112"/>
-        <pc:sldMkLst>
-          <pc:docMk/>
-          <pc:sldMk cId="2135561016" sldId="276"/>
-        </pc:sldMkLst>
-        <pc:spChg chg="mod">
-          <ac:chgData name="Ihor Aleksandrov" userId="c3051032-6b87-4db2-b257-777a0106fbd9" providerId="ADAL" clId="{D05EAF56-C8F0-4612-806C-93E1C27F1929}" dt="2024-01-25T10:32:37.109" v="72"/>
-          <ac:spMkLst>
-            <pc:docMk/>
-            <pc:sldMk cId="2135561016" sldId="276"/>
-            <ac:spMk id="2" creationId="{18C18207-A109-5552-1541-0ABBAA316282}"/>
-          </ac:spMkLst>
-        </pc:spChg>
-        <pc:spChg chg="del">
-          <ac:chgData name="Ihor Aleksandrov" userId="c3051032-6b87-4db2-b257-777a0106fbd9" providerId="ADAL" clId="{D05EAF56-C8F0-4612-806C-93E1C27F1929}" dt="2024-01-25T10:46:20.989" v="100" actId="478"/>
-          <ac:spMkLst>
-            <pc:docMk/>
-            <pc:sldMk cId="2135561016" sldId="276"/>
-            <ac:spMk id="3" creationId="{3473E1D3-7401-AD94-5C7A-49912FA8005A}"/>
-          </ac:spMkLst>
-        </pc:spChg>
-        <pc:picChg chg="add mod">
-          <ac:chgData name="Ihor Aleksandrov" userId="c3051032-6b87-4db2-b257-777a0106fbd9" providerId="ADAL" clId="{D05EAF56-C8F0-4612-806C-93E1C27F1929}" dt="2024-01-25T10:48:12.411" v="112"/>
-          <ac:picMkLst>
-            <pc:docMk/>
-            <pc:sldMk cId="2135561016" sldId="276"/>
-            <ac:picMk id="6" creationId="{BA86DDBB-D80D-1005-2EB0-33056830C288}"/>
-          </ac:picMkLst>
-        </pc:picChg>
-      </pc:sldChg>
-      <pc:sldChg chg="addSp delSp modSp add mod ord">
-        <pc:chgData name="Ihor Aleksandrov" userId="c3051032-6b87-4db2-b257-777a0106fbd9" providerId="ADAL" clId="{D05EAF56-C8F0-4612-806C-93E1C27F1929}" dt="2024-01-25T10:35:32.671" v="88" actId="1076"/>
-        <pc:sldMkLst>
-          <pc:docMk/>
-          <pc:sldMk cId="3216895555" sldId="277"/>
-        </pc:sldMkLst>
-        <pc:spChg chg="mod">
-          <ac:chgData name="Ihor Aleksandrov" userId="c3051032-6b87-4db2-b257-777a0106fbd9" providerId="ADAL" clId="{D05EAF56-C8F0-4612-806C-93E1C27F1929}" dt="2024-01-25T10:34:55.016" v="80" actId="27636"/>
-          <ac:spMkLst>
-            <pc:docMk/>
-            <pc:sldMk cId="3216895555" sldId="277"/>
-            <ac:spMk id="2" creationId="{53C5D828-9666-E312-B574-9FE965A7D6BE}"/>
-          </ac:spMkLst>
-        </pc:spChg>
-        <pc:picChg chg="add mod">
-          <ac:chgData name="Ihor Aleksandrov" userId="c3051032-6b87-4db2-b257-777a0106fbd9" providerId="ADAL" clId="{D05EAF56-C8F0-4612-806C-93E1C27F1929}" dt="2024-01-25T10:35:32.671" v="88" actId="1076"/>
-          <ac:picMkLst>
-            <pc:docMk/>
-            <pc:sldMk cId="3216895555" sldId="277"/>
-            <ac:picMk id="5" creationId="{523B5826-3FED-E033-7A50-454B720EF960}"/>
-          </ac:picMkLst>
-        </pc:picChg>
-        <pc:picChg chg="del">
-          <ac:chgData name="Ihor Aleksandrov" userId="c3051032-6b87-4db2-b257-777a0106fbd9" providerId="ADAL" clId="{D05EAF56-C8F0-4612-806C-93E1C27F1929}" dt="2024-01-25T10:35:17.826" v="82" actId="478"/>
-          <ac:picMkLst>
-            <pc:docMk/>
-            <pc:sldMk cId="3216895555" sldId="277"/>
-            <ac:picMk id="6" creationId="{76FE2D85-671A-24B1-C1D7-52F796E16C69}"/>
-          </ac:picMkLst>
-        </pc:picChg>
-      </pc:sldChg>
-      <pc:sldChg chg="addSp delSp modSp add mod">
-        <pc:chgData name="Ihor Aleksandrov" userId="c3051032-6b87-4db2-b257-777a0106fbd9" providerId="ADAL" clId="{D05EAF56-C8F0-4612-806C-93E1C27F1929}" dt="2024-01-25T10:43:44.832" v="99" actId="1076"/>
-        <pc:sldMkLst>
-          <pc:docMk/>
-          <pc:sldMk cId="1506611494" sldId="278"/>
-        </pc:sldMkLst>
-        <pc:spChg chg="mod">
-          <ac:chgData name="Ihor Aleksandrov" userId="c3051032-6b87-4db2-b257-777a0106fbd9" providerId="ADAL" clId="{D05EAF56-C8F0-4612-806C-93E1C27F1929}" dt="2024-01-25T10:40:14.102" v="94"/>
-          <ac:spMkLst>
-            <pc:docMk/>
-            <pc:sldMk cId="1506611494" sldId="278"/>
-            <ac:spMk id="2" creationId="{53C5D828-9666-E312-B574-9FE965A7D6BE}"/>
-          </ac:spMkLst>
-        </pc:spChg>
-        <pc:picChg chg="del">
-          <ac:chgData name="Ihor Aleksandrov" userId="c3051032-6b87-4db2-b257-777a0106fbd9" providerId="ADAL" clId="{D05EAF56-C8F0-4612-806C-93E1C27F1929}" dt="2024-01-25T10:43:36.501" v="95" actId="478"/>
-          <ac:picMkLst>
-            <pc:docMk/>
-            <pc:sldMk cId="1506611494" sldId="278"/>
-            <ac:picMk id="5" creationId="{523B5826-3FED-E033-7A50-454B720EF960}"/>
-          </ac:picMkLst>
-        </pc:picChg>
-        <pc:picChg chg="add mod">
-          <ac:chgData name="Ihor Aleksandrov" userId="c3051032-6b87-4db2-b257-777a0106fbd9" providerId="ADAL" clId="{D05EAF56-C8F0-4612-806C-93E1C27F1929}" dt="2024-01-25T10:43:44.832" v="99" actId="1076"/>
-          <ac:picMkLst>
-            <pc:docMk/>
-            <pc:sldMk cId="1506611494" sldId="278"/>
-            <ac:picMk id="6" creationId="{F7B4799B-BEB4-BC82-1CD6-CE4E3725E9A6}"/>
-          </ac:picMkLst>
-        </pc:picChg>
-      </pc:sldChg>
-      <pc:sldChg chg="addSp delSp modSp add mod">
-        <pc:chgData name="Ihor Aleksandrov" userId="c3051032-6b87-4db2-b257-777a0106fbd9" providerId="ADAL" clId="{D05EAF56-C8F0-4612-806C-93E1C27F1929}" dt="2024-01-25T10:49:48.310" v="120"/>
-        <pc:sldMkLst>
-          <pc:docMk/>
-          <pc:sldMk cId="3864832451" sldId="279"/>
-        </pc:sldMkLst>
-        <pc:spChg chg="mod">
-          <ac:chgData name="Ihor Aleksandrov" userId="c3051032-6b87-4db2-b257-777a0106fbd9" providerId="ADAL" clId="{D05EAF56-C8F0-4612-806C-93E1C27F1929}" dt="2024-01-25T10:49:48.310" v="120"/>
-          <ac:spMkLst>
-            <pc:docMk/>
-            <pc:sldMk cId="3864832451" sldId="279"/>
-            <ac:spMk id="2" creationId="{53C5D828-9666-E312-B574-9FE965A7D6BE}"/>
-          </ac:spMkLst>
-        </pc:spChg>
-        <pc:picChg chg="add mod">
-          <ac:chgData name="Ihor Aleksandrov" userId="c3051032-6b87-4db2-b257-777a0106fbd9" providerId="ADAL" clId="{D05EAF56-C8F0-4612-806C-93E1C27F1929}" dt="2024-01-25T10:49:09.073" v="117" actId="1076"/>
-          <ac:picMkLst>
-            <pc:docMk/>
-            <pc:sldMk cId="3864832451" sldId="279"/>
-            <ac:picMk id="5" creationId="{C7472C97-E950-C6C2-19AE-07ECFA5C4C69}"/>
-          </ac:picMkLst>
-        </pc:picChg>
-        <pc:picChg chg="del">
-          <ac:chgData name="Ihor Aleksandrov" userId="c3051032-6b87-4db2-b257-777a0106fbd9" providerId="ADAL" clId="{D05EAF56-C8F0-4612-806C-93E1C27F1929}" dt="2024-01-25T10:48:53.887" v="114" actId="478"/>
-          <ac:picMkLst>
-            <pc:docMk/>
-            <pc:sldMk cId="3864832451" sldId="279"/>
-            <ac:picMk id="6" creationId="{F7B4799B-BEB4-BC82-1CD6-CE4E3725E9A6}"/>
-          </ac:picMkLst>
-        </pc:picChg>
-      </pc:sldChg>
-      <pc:sldChg chg="addSp delSp modSp add mod">
-        <pc:chgData name="Ihor Aleksandrov" userId="c3051032-6b87-4db2-b257-777a0106fbd9" providerId="ADAL" clId="{D05EAF56-C8F0-4612-806C-93E1C27F1929}" dt="2024-01-25T10:51:39.984" v="127" actId="1076"/>
-        <pc:sldMkLst>
-          <pc:docMk/>
-          <pc:sldMk cId="2194478224" sldId="280"/>
-        </pc:sldMkLst>
-        <pc:spChg chg="mod">
-          <ac:chgData name="Ihor Aleksandrov" userId="c3051032-6b87-4db2-b257-777a0106fbd9" providerId="ADAL" clId="{D05EAF56-C8F0-4612-806C-93E1C27F1929}" dt="2024-01-25T10:51:25.127" v="124"/>
-          <ac:spMkLst>
-            <pc:docMk/>
-            <pc:sldMk cId="2194478224" sldId="280"/>
-            <ac:spMk id="2" creationId="{53C5D828-9666-E312-B574-9FE965A7D6BE}"/>
-          </ac:spMkLst>
-        </pc:spChg>
-        <pc:picChg chg="add mod">
-          <ac:chgData name="Ihor Aleksandrov" userId="c3051032-6b87-4db2-b257-777a0106fbd9" providerId="ADAL" clId="{D05EAF56-C8F0-4612-806C-93E1C27F1929}" dt="2024-01-25T10:51:39.984" v="127" actId="1076"/>
-          <ac:picMkLst>
-            <pc:docMk/>
-            <pc:sldMk cId="2194478224" sldId="280"/>
-            <ac:picMk id="4" creationId="{8F2E114A-EFDE-8D45-E482-1B0918ACBF79}"/>
-          </ac:picMkLst>
-        </pc:picChg>
-        <pc:picChg chg="del">
-          <ac:chgData name="Ihor Aleksandrov" userId="c3051032-6b87-4db2-b257-777a0106fbd9" providerId="ADAL" clId="{D05EAF56-C8F0-4612-806C-93E1C27F1929}" dt="2024-01-25T10:51:26.612" v="125" actId="478"/>
-          <ac:picMkLst>
-            <pc:docMk/>
-            <pc:sldMk cId="2194478224" sldId="280"/>
-            <ac:picMk id="5" creationId="{C7472C97-E950-C6C2-19AE-07ECFA5C4C69}"/>
-          </ac:picMkLst>
-        </pc:picChg>
-      </pc:sldChg>
-      <pc:sldChg chg="delSp modSp add mod ord">
-        <pc:chgData name="Ihor Aleksandrov" userId="c3051032-6b87-4db2-b257-777a0106fbd9" providerId="ADAL" clId="{D05EAF56-C8F0-4612-806C-93E1C27F1929}" dt="2024-01-25T10:53:57.961" v="142" actId="20577"/>
-        <pc:sldMkLst>
-          <pc:docMk/>
-          <pc:sldMk cId="2205366352" sldId="281"/>
-        </pc:sldMkLst>
-        <pc:spChg chg="mod">
-          <ac:chgData name="Ihor Aleksandrov" userId="c3051032-6b87-4db2-b257-777a0106fbd9" providerId="ADAL" clId="{D05EAF56-C8F0-4612-806C-93E1C27F1929}" dt="2024-01-25T10:53:57.961" v="142" actId="20577"/>
-          <ac:spMkLst>
-            <pc:docMk/>
-            <pc:sldMk cId="2205366352" sldId="281"/>
-            <ac:spMk id="2" creationId="{18C18207-A109-5552-1541-0ABBAA316282}"/>
-          </ac:spMkLst>
-        </pc:spChg>
-        <pc:picChg chg="del">
-          <ac:chgData name="Ihor Aleksandrov" userId="c3051032-6b87-4db2-b257-777a0106fbd9" providerId="ADAL" clId="{D05EAF56-C8F0-4612-806C-93E1C27F1929}" dt="2024-01-25T10:53:50.795" v="134" actId="478"/>
-          <ac:picMkLst>
-            <pc:docMk/>
-            <pc:sldMk cId="2205366352" sldId="281"/>
-            <ac:picMk id="6" creationId="{BA86DDBB-D80D-1005-2EB0-33056830C288}"/>
-          </ac:picMkLst>
-        </pc:picChg>
-      </pc:sldChg>
-      <pc:sldChg chg="delSp add del setBg delDesignElem">
-        <pc:chgData name="Ihor Aleksandrov" userId="c3051032-6b87-4db2-b257-777a0106fbd9" providerId="ADAL" clId="{D05EAF56-C8F0-4612-806C-93E1C27F1929}" dt="2024-01-25T10:53:38.779" v="130" actId="47"/>
-        <pc:sldMkLst>
-          <pc:docMk/>
-          <pc:sldMk cId="2518075034" sldId="281"/>
-        </pc:sldMkLst>
-        <pc:spChg chg="del">
-          <ac:chgData name="Ihor Aleksandrov" userId="c3051032-6b87-4db2-b257-777a0106fbd9" providerId="ADAL" clId="{D05EAF56-C8F0-4612-806C-93E1C27F1929}" dt="2024-01-25T10:53:27.044" v="129"/>
-          <ac:spMkLst>
-            <pc:docMk/>
-            <pc:sldMk cId="2518075034" sldId="281"/>
-            <ac:spMk id="9" creationId="{C3896A03-3945-419A-B66B-4EE266EDD152}"/>
-          </ac:spMkLst>
-        </pc:spChg>
-        <pc:spChg chg="del">
-          <ac:chgData name="Ihor Aleksandrov" userId="c3051032-6b87-4db2-b257-777a0106fbd9" providerId="ADAL" clId="{D05EAF56-C8F0-4612-806C-93E1C27F1929}" dt="2024-01-25T10:53:27.044" v="129"/>
-          <ac:spMkLst>
-            <pc:docMk/>
-            <pc:sldMk cId="2518075034" sldId="281"/>
-            <ac:spMk id="11" creationId="{B34F5AD2-EDBD-4BBD-A55C-EAFFD0C7097A}"/>
-          </ac:spMkLst>
-        </pc:spChg>
-      </pc:sldChg>
-      <pc:sldChg chg="modSp add mod ord">
-        <pc:chgData name="Ihor Aleksandrov" userId="c3051032-6b87-4db2-b257-777a0106fbd9" providerId="ADAL" clId="{D05EAF56-C8F0-4612-806C-93E1C27F1929}" dt="2024-01-25T10:55:39.680" v="152" actId="20577"/>
-        <pc:sldMkLst>
-          <pc:docMk/>
-          <pc:sldMk cId="2028152352" sldId="282"/>
-        </pc:sldMkLst>
-        <pc:spChg chg="mod">
-          <ac:chgData name="Ihor Aleksandrov" userId="c3051032-6b87-4db2-b257-777a0106fbd9" providerId="ADAL" clId="{D05EAF56-C8F0-4612-806C-93E1C27F1929}" dt="2024-01-25T10:55:39.680" v="152" actId="20577"/>
-          <ac:spMkLst>
-            <pc:docMk/>
-            <pc:sldMk cId="2028152352" sldId="282"/>
-            <ac:spMk id="2" creationId="{18C18207-A109-5552-1541-0ABBAA316282}"/>
-          </ac:spMkLst>
-        </pc:spChg>
-      </pc:sldChg>
-      <pc:sldChg chg="modSp add mod ord">
-        <pc:chgData name="Ihor Aleksandrov" userId="c3051032-6b87-4db2-b257-777a0106fbd9" providerId="ADAL" clId="{D05EAF56-C8F0-4612-806C-93E1C27F1929}" dt="2024-01-25T11:01:05.747" v="171"/>
-        <pc:sldMkLst>
-          <pc:docMk/>
-          <pc:sldMk cId="2433051637" sldId="283"/>
-        </pc:sldMkLst>
-        <pc:spChg chg="mod">
-          <ac:chgData name="Ihor Aleksandrov" userId="c3051032-6b87-4db2-b257-777a0106fbd9" providerId="ADAL" clId="{D05EAF56-C8F0-4612-806C-93E1C27F1929}" dt="2024-01-25T11:01:05.747" v="171"/>
-          <ac:spMkLst>
-            <pc:docMk/>
-            <pc:sldMk cId="2433051637" sldId="283"/>
-            <ac:spMk id="2" creationId="{53C5D828-9666-E312-B574-9FE965A7D6BE}"/>
-          </ac:spMkLst>
-        </pc:spChg>
-      </pc:sldChg>
-      <pc:sldChg chg="addSp delSp modSp add mod">
-        <pc:chgData name="Ihor Aleksandrov" userId="c3051032-6b87-4db2-b257-777a0106fbd9" providerId="ADAL" clId="{D05EAF56-C8F0-4612-806C-93E1C27F1929}" dt="2024-01-25T11:22:22.700" v="219" actId="14100"/>
-        <pc:sldMkLst>
-          <pc:docMk/>
-          <pc:sldMk cId="2869825701" sldId="284"/>
-        </pc:sldMkLst>
-        <pc:spChg chg="mod">
-          <ac:chgData name="Ihor Aleksandrov" userId="c3051032-6b87-4db2-b257-777a0106fbd9" providerId="ADAL" clId="{D05EAF56-C8F0-4612-806C-93E1C27F1929}" dt="2024-01-25T11:01:51.992" v="175"/>
-          <ac:spMkLst>
-            <pc:docMk/>
-            <pc:sldMk cId="2869825701" sldId="284"/>
-            <ac:spMk id="2" creationId="{53C5D828-9666-E312-B574-9FE965A7D6BE}"/>
-          </ac:spMkLst>
-        </pc:spChg>
-        <pc:spChg chg="del">
-          <ac:chgData name="Ihor Aleksandrov" userId="c3051032-6b87-4db2-b257-777a0106fbd9" providerId="ADAL" clId="{D05EAF56-C8F0-4612-806C-93E1C27F1929}" dt="2024-01-25T11:22:01.808" v="214" actId="478"/>
-          <ac:spMkLst>
-            <pc:docMk/>
-            <pc:sldMk cId="2869825701" sldId="284"/>
-            <ac:spMk id="6" creationId="{E04F08BD-B70E-B1A8-7328-EE29B18E4AA1}"/>
-          </ac:spMkLst>
-        </pc:spChg>
-        <pc:picChg chg="add mod">
-          <ac:chgData name="Ihor Aleksandrov" userId="c3051032-6b87-4db2-b257-777a0106fbd9" providerId="ADAL" clId="{D05EAF56-C8F0-4612-806C-93E1C27F1929}" dt="2024-01-25T11:22:22.700" v="219" actId="14100"/>
-          <ac:picMkLst>
-            <pc:docMk/>
-            <pc:sldMk cId="2869825701" sldId="284"/>
-            <ac:picMk id="5" creationId="{0885AC12-A488-3762-3217-E1B0319D46AD}"/>
-          </ac:picMkLst>
-        </pc:picChg>
-      </pc:sldChg>
-      <pc:sldChg chg="addSp delSp add del setBg delDesignElem">
-        <pc:chgData name="Ihor Aleksandrov" userId="c3051032-6b87-4db2-b257-777a0106fbd9" providerId="ADAL" clId="{D05EAF56-C8F0-4612-806C-93E1C27F1929}" dt="2024-01-25T11:00:55.998" v="168"/>
-        <pc:sldMkLst>
-          <pc:docMk/>
-          <pc:sldMk cId="3157685417" sldId="284"/>
-        </pc:sldMkLst>
-        <pc:spChg chg="add del">
-          <ac:chgData name="Ihor Aleksandrov" userId="c3051032-6b87-4db2-b257-777a0106fbd9" providerId="ADAL" clId="{D05EAF56-C8F0-4612-806C-93E1C27F1929}" dt="2024-01-25T11:00:55.998" v="168"/>
-          <ac:spMkLst>
-            <pc:docMk/>
-            <pc:sldMk cId="3157685417" sldId="284"/>
-            <ac:spMk id="9" creationId="{D4771268-CB57-404A-9271-370EB28F6090}"/>
-          </ac:spMkLst>
-        </pc:spChg>
-      </pc:sldChg>
-      <pc:sldChg chg="addSp delSp modSp add mod">
-        <pc:chgData name="Ihor Aleksandrov" userId="c3051032-6b87-4db2-b257-777a0106fbd9" providerId="ADAL" clId="{D05EAF56-C8F0-4612-806C-93E1C27F1929}" dt="2024-01-25T11:03:48.850" v="202" actId="1036"/>
-        <pc:sldMkLst>
-          <pc:docMk/>
-          <pc:sldMk cId="856240837" sldId="285"/>
-        </pc:sldMkLst>
-        <pc:spChg chg="mod">
-          <ac:chgData name="Ihor Aleksandrov" userId="c3051032-6b87-4db2-b257-777a0106fbd9" providerId="ADAL" clId="{D05EAF56-C8F0-4612-806C-93E1C27F1929}" dt="2024-01-25T11:03:18.596" v="177"/>
-          <ac:spMkLst>
-            <pc:docMk/>
-            <pc:sldMk cId="856240837" sldId="285"/>
-            <ac:spMk id="2" creationId="{53C5D828-9666-E312-B574-9FE965A7D6BE}"/>
-          </ac:spMkLst>
-        </pc:spChg>
-        <pc:spChg chg="del">
-          <ac:chgData name="Ihor Aleksandrov" userId="c3051032-6b87-4db2-b257-777a0106fbd9" providerId="ADAL" clId="{D05EAF56-C8F0-4612-806C-93E1C27F1929}" dt="2024-01-25T11:03:21.592" v="178" actId="478"/>
-          <ac:spMkLst>
-            <pc:docMk/>
-            <pc:sldMk cId="856240837" sldId="285"/>
-            <ac:spMk id="6" creationId="{E04F08BD-B70E-B1A8-7328-EE29B18E4AA1}"/>
-          </ac:spMkLst>
-        </pc:spChg>
-        <pc:picChg chg="add mod">
-          <ac:chgData name="Ihor Aleksandrov" userId="c3051032-6b87-4db2-b257-777a0106fbd9" providerId="ADAL" clId="{D05EAF56-C8F0-4612-806C-93E1C27F1929}" dt="2024-01-25T11:03:48.850" v="202" actId="1036"/>
-          <ac:picMkLst>
-            <pc:docMk/>
-            <pc:sldMk cId="856240837" sldId="285"/>
-            <ac:picMk id="4" creationId="{A8C20435-8FF0-1341-85C4-558E352F27E5}"/>
-          </ac:picMkLst>
-        </pc:picChg>
-      </pc:sldChg>
-      <pc:sldChg chg="modSp add mod ord">
-        <pc:chgData name="Ihor Aleksandrov" userId="c3051032-6b87-4db2-b257-777a0106fbd9" providerId="ADAL" clId="{D05EAF56-C8F0-4612-806C-93E1C27F1929}" dt="2024-01-25T11:10:32.927" v="210"/>
-        <pc:sldMkLst>
-          <pc:docMk/>
-          <pc:sldMk cId="1586376586" sldId="286"/>
-        </pc:sldMkLst>
-        <pc:spChg chg="mod">
-          <ac:chgData name="Ihor Aleksandrov" userId="c3051032-6b87-4db2-b257-777a0106fbd9" providerId="ADAL" clId="{D05EAF56-C8F0-4612-806C-93E1C27F1929}" dt="2024-01-25T11:10:32.927" v="210"/>
-          <ac:spMkLst>
-            <pc:docMk/>
-            <pc:sldMk cId="1586376586" sldId="286"/>
-            <ac:spMk id="2" creationId="{53C5D828-9666-E312-B574-9FE965A7D6BE}"/>
-          </ac:spMkLst>
-        </pc:spChg>
-      </pc:sldChg>
-      <pc:sldChg chg="add del">
-        <pc:chgData name="Ihor Aleksandrov" userId="c3051032-6b87-4db2-b257-777a0106fbd9" providerId="ADAL" clId="{D05EAF56-C8F0-4612-806C-93E1C27F1929}" dt="2024-01-25T11:10:15.704" v="204" actId="2696"/>
-        <pc:sldMkLst>
-          <pc:docMk/>
-          <pc:sldMk cId="2392975250" sldId="286"/>
-        </pc:sldMkLst>
-      </pc:sldChg>
-      <pc:sldChg chg="modSp add mod ord">
-        <pc:chgData name="Ihor Aleksandrov" userId="c3051032-6b87-4db2-b257-777a0106fbd9" providerId="ADAL" clId="{D05EAF56-C8F0-4612-806C-93E1C27F1929}" dt="2024-01-25T11:27:00.546" v="224" actId="20577"/>
-        <pc:sldMkLst>
-          <pc:docMk/>
-          <pc:sldMk cId="2004498921" sldId="287"/>
-        </pc:sldMkLst>
-        <pc:spChg chg="mod">
-          <ac:chgData name="Ihor Aleksandrov" userId="c3051032-6b87-4db2-b257-777a0106fbd9" providerId="ADAL" clId="{D05EAF56-C8F0-4612-806C-93E1C27F1929}" dt="2024-01-25T11:27:00.546" v="224" actId="20577"/>
-          <ac:spMkLst>
-            <pc:docMk/>
-            <pc:sldMk cId="2004498921" sldId="287"/>
-            <ac:spMk id="2" creationId="{18C18207-A109-5552-1541-0ABBAA316282}"/>
-          </ac:spMkLst>
-        </pc:spChg>
-      </pc:sldChg>
-      <pc:sldChg chg="addSp delSp modSp add mod ord">
-        <pc:chgData name="Ihor Aleksandrov" userId="c3051032-6b87-4db2-b257-777a0106fbd9" providerId="ADAL" clId="{D05EAF56-C8F0-4612-806C-93E1C27F1929}" dt="2024-01-25T11:28:34.816" v="233" actId="1076"/>
-        <pc:sldMkLst>
-          <pc:docMk/>
-          <pc:sldMk cId="156474206" sldId="288"/>
-        </pc:sldMkLst>
-        <pc:spChg chg="mod">
-          <ac:chgData name="Ihor Aleksandrov" userId="c3051032-6b87-4db2-b257-777a0106fbd9" providerId="ADAL" clId="{D05EAF56-C8F0-4612-806C-93E1C27F1929}" dt="2024-01-25T11:28:25.547" v="230"/>
-          <ac:spMkLst>
-            <pc:docMk/>
-            <pc:sldMk cId="156474206" sldId="288"/>
-            <ac:spMk id="2" creationId="{53C5D828-9666-E312-B574-9FE965A7D6BE}"/>
-          </ac:spMkLst>
-        </pc:spChg>
-        <pc:spChg chg="del">
-          <ac:chgData name="Ihor Aleksandrov" userId="c3051032-6b87-4db2-b257-777a0106fbd9" providerId="ADAL" clId="{D05EAF56-C8F0-4612-806C-93E1C27F1929}" dt="2024-01-25T11:28:27.105" v="231" actId="478"/>
-          <ac:spMkLst>
-            <pc:docMk/>
-            <pc:sldMk cId="156474206" sldId="288"/>
-            <ac:spMk id="6" creationId="{E04F08BD-B70E-B1A8-7328-EE29B18E4AA1}"/>
-          </ac:spMkLst>
-        </pc:spChg>
-        <pc:picChg chg="add mod">
-          <ac:chgData name="Ihor Aleksandrov" userId="c3051032-6b87-4db2-b257-777a0106fbd9" providerId="ADAL" clId="{D05EAF56-C8F0-4612-806C-93E1C27F1929}" dt="2024-01-25T11:28:34.816" v="233" actId="1076"/>
-          <ac:picMkLst>
-            <pc:docMk/>
-            <pc:sldMk cId="156474206" sldId="288"/>
-            <ac:picMk id="4" creationId="{0D7416A8-5E31-A6F5-922C-BB434A29C3EE}"/>
-          </ac:picMkLst>
-        </pc:picChg>
-      </pc:sldChg>
-      <pc:sldChg chg="modSp add mod ord">
-        <pc:chgData name="Ihor Aleksandrov" userId="c3051032-6b87-4db2-b257-777a0106fbd9" providerId="ADAL" clId="{D05EAF56-C8F0-4612-806C-93E1C27F1929}" dt="2024-01-25T11:29:51.583" v="244"/>
-        <pc:sldMkLst>
-          <pc:docMk/>
-          <pc:sldMk cId="2551930029" sldId="289"/>
-        </pc:sldMkLst>
-        <pc:spChg chg="mod">
-          <ac:chgData name="Ihor Aleksandrov" userId="c3051032-6b87-4db2-b257-777a0106fbd9" providerId="ADAL" clId="{D05EAF56-C8F0-4612-806C-93E1C27F1929}" dt="2024-01-25T11:29:47.752" v="242" actId="20577"/>
-          <ac:spMkLst>
-            <pc:docMk/>
-            <pc:sldMk cId="2551930029" sldId="289"/>
-            <ac:spMk id="2" creationId="{18C18207-A109-5552-1541-0ABBAA316282}"/>
-          </ac:spMkLst>
-        </pc:spChg>
-      </pc:sldChg>
-      <pc:sldChg chg="addSp delSp modSp add mod ord">
-        <pc:chgData name="Ihor Aleksandrov" userId="c3051032-6b87-4db2-b257-777a0106fbd9" providerId="ADAL" clId="{D05EAF56-C8F0-4612-806C-93E1C27F1929}" dt="2024-01-25T11:49:38.267" v="257" actId="1076"/>
-        <pc:sldMkLst>
-          <pc:docMk/>
-          <pc:sldMk cId="1939738048" sldId="290"/>
-        </pc:sldMkLst>
-        <pc:spChg chg="mod">
-          <ac:chgData name="Ihor Aleksandrov" userId="c3051032-6b87-4db2-b257-777a0106fbd9" providerId="ADAL" clId="{D05EAF56-C8F0-4612-806C-93E1C27F1929}" dt="2024-01-25T11:49:07.853" v="250"/>
-          <ac:spMkLst>
-            <pc:docMk/>
-            <pc:sldMk cId="1939738048" sldId="290"/>
-            <ac:spMk id="2" creationId="{53C5D828-9666-E312-B574-9FE965A7D6BE}"/>
-          </ac:spMkLst>
-        </pc:spChg>
-        <pc:spChg chg="del">
-          <ac:chgData name="Ihor Aleksandrov" userId="c3051032-6b87-4db2-b257-777a0106fbd9" providerId="ADAL" clId="{D05EAF56-C8F0-4612-806C-93E1C27F1929}" dt="2024-01-25T11:49:20.582" v="251" actId="478"/>
-          <ac:spMkLst>
-            <pc:docMk/>
-            <pc:sldMk cId="1939738048" sldId="290"/>
-            <ac:spMk id="6" creationId="{E04F08BD-B70E-B1A8-7328-EE29B18E4AA1}"/>
-          </ac:spMkLst>
-        </pc:spChg>
-        <pc:picChg chg="add mod">
-          <ac:chgData name="Ihor Aleksandrov" userId="c3051032-6b87-4db2-b257-777a0106fbd9" providerId="ADAL" clId="{D05EAF56-C8F0-4612-806C-93E1C27F1929}" dt="2024-01-25T11:49:38.267" v="257" actId="1076"/>
-          <ac:picMkLst>
-            <pc:docMk/>
-            <pc:sldMk cId="1939738048" sldId="290"/>
-            <ac:picMk id="4" creationId="{49B21785-1E7E-8457-4FBF-E3FC2CCADD04}"/>
-          </ac:picMkLst>
-        </pc:picChg>
-      </pc:sldChg>
-      <pc:sldChg chg="modSp add mod ord">
-        <pc:chgData name="Ihor Aleksandrov" userId="c3051032-6b87-4db2-b257-777a0106fbd9" providerId="ADAL" clId="{D05EAF56-C8F0-4612-806C-93E1C27F1929}" dt="2024-01-25T11:51:45.959" v="263"/>
-        <pc:sldMkLst>
-          <pc:docMk/>
-          <pc:sldMk cId="1018496090" sldId="291"/>
-        </pc:sldMkLst>
-        <pc:spChg chg="mod">
-          <ac:chgData name="Ihor Aleksandrov" userId="c3051032-6b87-4db2-b257-777a0106fbd9" providerId="ADAL" clId="{D05EAF56-C8F0-4612-806C-93E1C27F1929}" dt="2024-01-25T11:51:45.959" v="263"/>
-          <ac:spMkLst>
-            <pc:docMk/>
-            <pc:sldMk cId="1018496090" sldId="291"/>
-            <ac:spMk id="2" creationId="{53C5D828-9666-E312-B574-9FE965A7D6BE}"/>
-          </ac:spMkLst>
-        </pc:spChg>
-      </pc:sldChg>
-      <pc:sldChg chg="modSp add mod">
-        <pc:chgData name="Ihor Aleksandrov" userId="c3051032-6b87-4db2-b257-777a0106fbd9" providerId="ADAL" clId="{D05EAF56-C8F0-4612-806C-93E1C27F1929}" dt="2024-01-25T11:53:09.928" v="267"/>
-        <pc:sldMkLst>
-          <pc:docMk/>
-          <pc:sldMk cId="2128635244" sldId="292"/>
-        </pc:sldMkLst>
-        <pc:spChg chg="mod">
-          <ac:chgData name="Ihor Aleksandrov" userId="c3051032-6b87-4db2-b257-777a0106fbd9" providerId="ADAL" clId="{D05EAF56-C8F0-4612-806C-93E1C27F1929}" dt="2024-01-25T11:53:09.928" v="267"/>
-          <ac:spMkLst>
-            <pc:docMk/>
-            <pc:sldMk cId="2128635244" sldId="292"/>
-            <ac:spMk id="2" creationId="{53C5D828-9666-E312-B574-9FE965A7D6BE}"/>
-          </ac:spMkLst>
-        </pc:spChg>
-      </pc:sldChg>
-      <pc:sldChg chg="addSp delSp modSp add mod">
-        <pc:chgData name="Ihor Aleksandrov" userId="c3051032-6b87-4db2-b257-777a0106fbd9" providerId="ADAL" clId="{D05EAF56-C8F0-4612-806C-93E1C27F1929}" dt="2024-01-25T11:55:41.171" v="279" actId="1076"/>
-        <pc:sldMkLst>
-          <pc:docMk/>
-          <pc:sldMk cId="2059493005" sldId="293"/>
-        </pc:sldMkLst>
-        <pc:spChg chg="mod">
-          <ac:chgData name="Ihor Aleksandrov" userId="c3051032-6b87-4db2-b257-777a0106fbd9" providerId="ADAL" clId="{D05EAF56-C8F0-4612-806C-93E1C27F1929}" dt="2024-01-25T11:55:19.618" v="271"/>
-          <ac:spMkLst>
-            <pc:docMk/>
-            <pc:sldMk cId="2059493005" sldId="293"/>
-            <ac:spMk id="2" creationId="{53C5D828-9666-E312-B574-9FE965A7D6BE}"/>
-          </ac:spMkLst>
-        </pc:spChg>
-        <pc:spChg chg="del">
-          <ac:chgData name="Ihor Aleksandrov" userId="c3051032-6b87-4db2-b257-777a0106fbd9" providerId="ADAL" clId="{D05EAF56-C8F0-4612-806C-93E1C27F1929}" dt="2024-01-25T11:55:21.950" v="272" actId="478"/>
-          <ac:spMkLst>
-            <pc:docMk/>
-            <pc:sldMk cId="2059493005" sldId="293"/>
-            <ac:spMk id="6" creationId="{E04F08BD-B70E-B1A8-7328-EE29B18E4AA1}"/>
-          </ac:spMkLst>
-        </pc:spChg>
-        <pc:picChg chg="add mod">
-          <ac:chgData name="Ihor Aleksandrov" userId="c3051032-6b87-4db2-b257-777a0106fbd9" providerId="ADAL" clId="{D05EAF56-C8F0-4612-806C-93E1C27F1929}" dt="2024-01-25T11:55:41.171" v="279" actId="1076"/>
-          <ac:picMkLst>
-            <pc:docMk/>
-            <pc:sldMk cId="2059493005" sldId="293"/>
-            <ac:picMk id="4" creationId="{B4989CAB-F181-BB13-C3CC-7303FC972C04}"/>
-          </ac:picMkLst>
-        </pc:picChg>
-      </pc:sldChg>
-      <pc:sldChg chg="addSp delSp modSp add mod">
-        <pc:chgData name="Ihor Aleksandrov" userId="c3051032-6b87-4db2-b257-777a0106fbd9" providerId="ADAL" clId="{D05EAF56-C8F0-4612-806C-93E1C27F1929}" dt="2024-01-25T11:57:16.812" v="286" actId="1076"/>
-        <pc:sldMkLst>
-          <pc:docMk/>
-          <pc:sldMk cId="1734173143" sldId="294"/>
-        </pc:sldMkLst>
-        <pc:spChg chg="mod">
-          <ac:chgData name="Ihor Aleksandrov" userId="c3051032-6b87-4db2-b257-777a0106fbd9" providerId="ADAL" clId="{D05EAF56-C8F0-4612-806C-93E1C27F1929}" dt="2024-01-25T11:56:59.706" v="281"/>
-          <ac:spMkLst>
-            <pc:docMk/>
-            <pc:sldMk cId="1734173143" sldId="294"/>
-            <ac:spMk id="2" creationId="{53C5D828-9666-E312-B574-9FE965A7D6BE}"/>
-          </ac:spMkLst>
-        </pc:spChg>
-        <pc:picChg chg="del">
-          <ac:chgData name="Ihor Aleksandrov" userId="c3051032-6b87-4db2-b257-777a0106fbd9" providerId="ADAL" clId="{D05EAF56-C8F0-4612-806C-93E1C27F1929}" dt="2024-01-25T11:57:02.563" v="282" actId="478"/>
-          <ac:picMkLst>
-            <pc:docMk/>
-            <pc:sldMk cId="1734173143" sldId="294"/>
-            <ac:picMk id="4" creationId="{B4989CAB-F181-BB13-C3CC-7303FC972C04}"/>
-          </ac:picMkLst>
-        </pc:picChg>
-        <pc:picChg chg="add mod">
-          <ac:chgData name="Ihor Aleksandrov" userId="c3051032-6b87-4db2-b257-777a0106fbd9" providerId="ADAL" clId="{D05EAF56-C8F0-4612-806C-93E1C27F1929}" dt="2024-01-25T11:57:16.812" v="286" actId="1076"/>
-          <ac:picMkLst>
-            <pc:docMk/>
-            <pc:sldMk cId="1734173143" sldId="294"/>
-            <ac:picMk id="5" creationId="{EFB4AF76-9D94-7721-E2C8-2472D164A060}"/>
-          </ac:picMkLst>
-        </pc:picChg>
-      </pc:sldChg>
-      <pc:sldChg chg="addSp modSp add mod ord">
-        <pc:chgData name="Ihor Aleksandrov" userId="c3051032-6b87-4db2-b257-777a0106fbd9" providerId="ADAL" clId="{D05EAF56-C8F0-4612-806C-93E1C27F1929}" dt="2024-01-25T12:00:46.169" v="306" actId="1076"/>
-        <pc:sldMkLst>
-          <pc:docMk/>
-          <pc:sldMk cId="3102755718" sldId="295"/>
-        </pc:sldMkLst>
-        <pc:spChg chg="mod">
-          <ac:chgData name="Ihor Aleksandrov" userId="c3051032-6b87-4db2-b257-777a0106fbd9" providerId="ADAL" clId="{D05EAF56-C8F0-4612-806C-93E1C27F1929}" dt="2024-01-25T12:00:14.709" v="300" actId="20577"/>
-          <ac:spMkLst>
-            <pc:docMk/>
-            <pc:sldMk cId="3102755718" sldId="295"/>
-            <ac:spMk id="2" creationId="{18C18207-A109-5552-1541-0ABBAA316282}"/>
-          </ac:spMkLst>
-        </pc:spChg>
-        <pc:picChg chg="add mod">
-          <ac:chgData name="Ihor Aleksandrov" userId="c3051032-6b87-4db2-b257-777a0106fbd9" providerId="ADAL" clId="{D05EAF56-C8F0-4612-806C-93E1C27F1929}" dt="2024-01-25T12:00:46.169" v="306" actId="1076"/>
-          <ac:picMkLst>
-            <pc:docMk/>
-            <pc:sldMk cId="3102755718" sldId="295"/>
-            <ac:picMk id="5" creationId="{BD0CE974-8524-11E7-B97F-A86834867985}"/>
-          </ac:picMkLst>
-        </pc:picChg>
-      </pc:sldChg>
-      <pc:sldChg chg="modSp add mod ord">
-        <pc:chgData name="Ihor Aleksandrov" userId="c3051032-6b87-4db2-b257-777a0106fbd9" providerId="ADAL" clId="{D05EAF56-C8F0-4612-806C-93E1C27F1929}" dt="2024-01-25T12:02:45.112" v="310"/>
-        <pc:sldMkLst>
-          <pc:docMk/>
-          <pc:sldMk cId="2389832786" sldId="296"/>
-        </pc:sldMkLst>
-        <pc:spChg chg="mod">
-          <ac:chgData name="Ihor Aleksandrov" userId="c3051032-6b87-4db2-b257-777a0106fbd9" providerId="ADAL" clId="{D05EAF56-C8F0-4612-806C-93E1C27F1929}" dt="2024-01-25T12:02:45.112" v="310"/>
-          <ac:spMkLst>
-            <pc:docMk/>
-            <pc:sldMk cId="2389832786" sldId="296"/>
-            <ac:spMk id="2" creationId="{53C5D828-9666-E312-B574-9FE965A7D6BE}"/>
-          </ac:spMkLst>
-        </pc:spChg>
-      </pc:sldChg>
-      <pc:sldChg chg="modSp add mod">
-        <pc:chgData name="Ihor Aleksandrov" userId="c3051032-6b87-4db2-b257-777a0106fbd9" providerId="ADAL" clId="{D05EAF56-C8F0-4612-806C-93E1C27F1929}" dt="2024-01-25T12:04:01.736" v="312"/>
-        <pc:sldMkLst>
-          <pc:docMk/>
-          <pc:sldMk cId="2189799752" sldId="297"/>
-        </pc:sldMkLst>
-        <pc:spChg chg="mod">
-          <ac:chgData name="Ihor Aleksandrov" userId="c3051032-6b87-4db2-b257-777a0106fbd9" providerId="ADAL" clId="{D05EAF56-C8F0-4612-806C-93E1C27F1929}" dt="2024-01-25T12:04:01.736" v="312"/>
-          <ac:spMkLst>
-            <pc:docMk/>
-            <pc:sldMk cId="2189799752" sldId="297"/>
-            <ac:spMk id="2" creationId="{53C5D828-9666-E312-B574-9FE965A7D6BE}"/>
-          </ac:spMkLst>
-        </pc:spChg>
-      </pc:sldChg>
-      <pc:sldChg chg="modSp add mod">
-        <pc:chgData name="Ihor Aleksandrov" userId="c3051032-6b87-4db2-b257-777a0106fbd9" providerId="ADAL" clId="{D05EAF56-C8F0-4612-806C-93E1C27F1929}" dt="2024-01-25T12:05:00.878" v="314"/>
-        <pc:sldMkLst>
-          <pc:docMk/>
-          <pc:sldMk cId="3592285454" sldId="298"/>
-        </pc:sldMkLst>
-        <pc:spChg chg="mod">
-          <ac:chgData name="Ihor Aleksandrov" userId="c3051032-6b87-4db2-b257-777a0106fbd9" providerId="ADAL" clId="{D05EAF56-C8F0-4612-806C-93E1C27F1929}" dt="2024-01-25T12:05:00.878" v="314"/>
-          <ac:spMkLst>
-            <pc:docMk/>
-            <pc:sldMk cId="3592285454" sldId="298"/>
-            <ac:spMk id="2" creationId="{53C5D828-9666-E312-B574-9FE965A7D6BE}"/>
-          </ac:spMkLst>
-        </pc:spChg>
-      </pc:sldChg>
-      <pc:sldChg chg="modSp add mod">
-        <pc:chgData name="Ihor Aleksandrov" userId="c3051032-6b87-4db2-b257-777a0106fbd9" providerId="ADAL" clId="{D05EAF56-C8F0-4612-806C-93E1C27F1929}" dt="2024-01-25T12:08:02.278" v="316"/>
-        <pc:sldMkLst>
-          <pc:docMk/>
-          <pc:sldMk cId="4186553512" sldId="299"/>
-        </pc:sldMkLst>
-        <pc:spChg chg="mod">
-          <ac:chgData name="Ihor Aleksandrov" userId="c3051032-6b87-4db2-b257-777a0106fbd9" providerId="ADAL" clId="{D05EAF56-C8F0-4612-806C-93E1C27F1929}" dt="2024-01-25T12:08:02.278" v="316"/>
-          <ac:spMkLst>
-            <pc:docMk/>
-            <pc:sldMk cId="4186553512" sldId="299"/>
-            <ac:spMk id="2" creationId="{53C5D828-9666-E312-B574-9FE965A7D6BE}"/>
-          </ac:spMkLst>
-        </pc:spChg>
-      </pc:sldChg>
-      <pc:sldChg chg="modSp add mod">
-        <pc:chgData name="Ihor Aleksandrov" userId="c3051032-6b87-4db2-b257-777a0106fbd9" providerId="ADAL" clId="{D05EAF56-C8F0-4612-806C-93E1C27F1929}" dt="2024-01-25T12:09:53.445" v="318"/>
-        <pc:sldMkLst>
-          <pc:docMk/>
-          <pc:sldMk cId="834159653" sldId="300"/>
-        </pc:sldMkLst>
-        <pc:spChg chg="mod">
-          <ac:chgData name="Ihor Aleksandrov" userId="c3051032-6b87-4db2-b257-777a0106fbd9" providerId="ADAL" clId="{D05EAF56-C8F0-4612-806C-93E1C27F1929}" dt="2024-01-25T12:09:53.445" v="318"/>
-          <ac:spMkLst>
-            <pc:docMk/>
-            <pc:sldMk cId="834159653" sldId="300"/>
-            <ac:spMk id="2" creationId="{53C5D828-9666-E312-B574-9FE965A7D6BE}"/>
-          </ac:spMkLst>
-        </pc:spChg>
-      </pc:sldChg>
-      <pc:sldChg chg="modSp add mod">
-        <pc:chgData name="Ihor Aleksandrov" userId="c3051032-6b87-4db2-b257-777a0106fbd9" providerId="ADAL" clId="{D05EAF56-C8F0-4612-806C-93E1C27F1929}" dt="2024-01-25T12:10:57.045" v="321" actId="27636"/>
-        <pc:sldMkLst>
-          <pc:docMk/>
-          <pc:sldMk cId="324410250" sldId="301"/>
-        </pc:sldMkLst>
-        <pc:spChg chg="mod">
-          <ac:chgData name="Ihor Aleksandrov" userId="c3051032-6b87-4db2-b257-777a0106fbd9" providerId="ADAL" clId="{D05EAF56-C8F0-4612-806C-93E1C27F1929}" dt="2024-01-25T12:10:57.045" v="321" actId="27636"/>
-          <ac:spMkLst>
-            <pc:docMk/>
-            <pc:sldMk cId="324410250" sldId="301"/>
-            <ac:spMk id="2" creationId="{53C5D828-9666-E312-B574-9FE965A7D6BE}"/>
-          </ac:spMkLst>
-        </pc:spChg>
-      </pc:sldChg>
-      <pc:sldChg chg="add">
-        <pc:chgData name="Ihor Aleksandrov" userId="c3051032-6b87-4db2-b257-777a0106fbd9" providerId="ADAL" clId="{D05EAF56-C8F0-4612-806C-93E1C27F1929}" dt="2024-01-25T12:18:40.426" v="323"/>
-        <pc:sldMkLst>
-          <pc:docMk/>
-          <pc:sldMk cId="2052164358" sldId="302"/>
-        </pc:sldMkLst>
-      </pc:sldChg>
-      <pc:sldChg chg="add">
-        <pc:chgData name="Ihor Aleksandrov" userId="c3051032-6b87-4db2-b257-777a0106fbd9" providerId="ADAL" clId="{D05EAF56-C8F0-4612-806C-93E1C27F1929}" dt="2024-01-25T12:18:42.706" v="325"/>
-        <pc:sldMkLst>
-          <pc:docMk/>
-          <pc:sldMk cId="2972731808" sldId="303"/>
-        </pc:sldMkLst>
-      </pc:sldChg>
-      <pc:sldMasterChg chg="add addSldLayout">
-        <pc:chgData name="Ihor Aleksandrov" userId="c3051032-6b87-4db2-b257-777a0106fbd9" providerId="ADAL" clId="{D05EAF56-C8F0-4612-806C-93E1C27F1929}" dt="2024-01-25T12:18:42.701" v="324" actId="27028"/>
-        <pc:sldMasterMkLst>
-          <pc:docMk/>
-          <pc:sldMasterMk cId="1185679814" sldId="2147483648"/>
-        </pc:sldMasterMkLst>
-        <pc:sldLayoutChg chg="add">
-          <pc:chgData name="Ihor Aleksandrov" userId="c3051032-6b87-4db2-b257-777a0106fbd9" providerId="ADAL" clId="{D05EAF56-C8F0-4612-806C-93E1C27F1929}" dt="2024-01-25T12:18:40.421" v="322" actId="27028"/>
-          <pc:sldLayoutMkLst>
-            <pc:docMk/>
-            <pc:sldMasterMk cId="1185679814" sldId="2147483648"/>
-            <pc:sldLayoutMk cId="2257280135" sldId="2147483649"/>
-          </pc:sldLayoutMkLst>
-        </pc:sldLayoutChg>
-        <pc:sldLayoutChg chg="add">
-          <pc:chgData name="Ihor Aleksandrov" userId="c3051032-6b87-4db2-b257-777a0106fbd9" providerId="ADAL" clId="{D05EAF56-C8F0-4612-806C-93E1C27F1929}" dt="2024-01-25T12:18:42.701" v="324" actId="27028"/>
-          <pc:sldLayoutMkLst>
-            <pc:docMk/>
-            <pc:sldMasterMk cId="1185679814" sldId="2147483648"/>
-            <pc:sldLayoutMk cId="1044916995" sldId="2147483650"/>
           </pc:sldLayoutMkLst>
         </pc:sldLayoutChg>
       </pc:sldMasterChg>
@@ -1941,6 +1020,927 @@
           </ac:picMkLst>
         </pc:picChg>
       </pc:sldChg>
+    </pc:docChg>
+  </pc:docChgLst>
+  <pc:docChgLst>
+    <pc:chgData name="Ihor Aleksandrov" userId="c3051032-6b87-4db2-b257-777a0106fbd9" providerId="ADAL" clId="{D05EAF56-C8F0-4612-806C-93E1C27F1929}"/>
+    <pc:docChg chg="undo redo custSel addSld delSld modSld sldOrd addMainMaster addSection modSection">
+      <pc:chgData name="Ihor Aleksandrov" userId="c3051032-6b87-4db2-b257-777a0106fbd9" providerId="ADAL" clId="{D05EAF56-C8F0-4612-806C-93E1C27F1929}" dt="2024-01-25T12:18:42.706" v="325"/>
+      <pc:docMkLst>
+        <pc:docMk/>
+      </pc:docMkLst>
+      <pc:sldChg chg="addSp modSp mod setBg">
+        <pc:chgData name="Ihor Aleksandrov" userId="c3051032-6b87-4db2-b257-777a0106fbd9" providerId="ADAL" clId="{D05EAF56-C8F0-4612-806C-93E1C27F1929}" dt="2024-01-25T09:34:46.181" v="0" actId="26606"/>
+        <pc:sldMkLst>
+          <pc:docMk/>
+          <pc:sldMk cId="552267186" sldId="256"/>
+        </pc:sldMkLst>
+        <pc:spChg chg="mod">
+          <ac:chgData name="Ihor Aleksandrov" userId="c3051032-6b87-4db2-b257-777a0106fbd9" providerId="ADAL" clId="{D05EAF56-C8F0-4612-806C-93E1C27F1929}" dt="2024-01-25T09:34:46.181" v="0" actId="26606"/>
+          <ac:spMkLst>
+            <pc:docMk/>
+            <pc:sldMk cId="552267186" sldId="256"/>
+            <ac:spMk id="2" creationId="{18C18207-A109-5552-1541-0ABBAA316282}"/>
+          </ac:spMkLst>
+        </pc:spChg>
+        <pc:spChg chg="mod">
+          <ac:chgData name="Ihor Aleksandrov" userId="c3051032-6b87-4db2-b257-777a0106fbd9" providerId="ADAL" clId="{D05EAF56-C8F0-4612-806C-93E1C27F1929}" dt="2024-01-25T09:34:46.181" v="0" actId="26606"/>
+          <ac:spMkLst>
+            <pc:docMk/>
+            <pc:sldMk cId="552267186" sldId="256"/>
+            <ac:spMk id="3" creationId="{3473E1D3-7401-AD94-5C7A-49912FA8005A}"/>
+          </ac:spMkLst>
+        </pc:spChg>
+        <pc:spChg chg="mod">
+          <ac:chgData name="Ihor Aleksandrov" userId="c3051032-6b87-4db2-b257-777a0106fbd9" providerId="ADAL" clId="{D05EAF56-C8F0-4612-806C-93E1C27F1929}" dt="2024-01-25T09:34:46.181" v="0" actId="26606"/>
+          <ac:spMkLst>
+            <pc:docMk/>
+            <pc:sldMk cId="552267186" sldId="256"/>
+            <ac:spMk id="4" creationId="{C99D0D71-05C2-1881-DCFB-D99C1C10CBB8}"/>
+          </ac:spMkLst>
+        </pc:spChg>
+        <pc:spChg chg="add">
+          <ac:chgData name="Ihor Aleksandrov" userId="c3051032-6b87-4db2-b257-777a0106fbd9" providerId="ADAL" clId="{D05EAF56-C8F0-4612-806C-93E1C27F1929}" dt="2024-01-25T09:34:46.181" v="0" actId="26606"/>
+          <ac:spMkLst>
+            <pc:docMk/>
+            <pc:sldMk cId="552267186" sldId="256"/>
+            <ac:spMk id="9" creationId="{C3896A03-3945-419A-B66B-4EE266EDD152}"/>
+          </ac:spMkLst>
+        </pc:spChg>
+        <pc:spChg chg="add">
+          <ac:chgData name="Ihor Aleksandrov" userId="c3051032-6b87-4db2-b257-777a0106fbd9" providerId="ADAL" clId="{D05EAF56-C8F0-4612-806C-93E1C27F1929}" dt="2024-01-25T09:34:46.181" v="0" actId="26606"/>
+          <ac:spMkLst>
+            <pc:docMk/>
+            <pc:sldMk cId="552267186" sldId="256"/>
+            <ac:spMk id="11" creationId="{B34F5AD2-EDBD-4BBD-A55C-EAFFD0C7097A}"/>
+          </ac:spMkLst>
+        </pc:spChg>
+      </pc:sldChg>
+      <pc:sldChg chg="modSp mod">
+        <pc:chgData name="Ihor Aleksandrov" userId="c3051032-6b87-4db2-b257-777a0106fbd9" providerId="ADAL" clId="{D05EAF56-C8F0-4612-806C-93E1C27F1929}" dt="2024-01-25T11:00:29.329" v="160"/>
+        <pc:sldMkLst>
+          <pc:docMk/>
+          <pc:sldMk cId="3569579791" sldId="265"/>
+        </pc:sldMkLst>
+        <pc:spChg chg="mod">
+          <ac:chgData name="Ihor Aleksandrov" userId="c3051032-6b87-4db2-b257-777a0106fbd9" providerId="ADAL" clId="{D05EAF56-C8F0-4612-806C-93E1C27F1929}" dt="2024-01-25T11:00:29.329" v="160"/>
+          <ac:spMkLst>
+            <pc:docMk/>
+            <pc:sldMk cId="3569579791" sldId="265"/>
+            <ac:spMk id="2" creationId="{53C5D828-9666-E312-B574-9FE965A7D6BE}"/>
+          </ac:spMkLst>
+        </pc:spChg>
+      </pc:sldChg>
+      <pc:sldChg chg="addSp delSp modSp add mod">
+        <pc:chgData name="Ihor Aleksandrov" userId="c3051032-6b87-4db2-b257-777a0106fbd9" providerId="ADAL" clId="{D05EAF56-C8F0-4612-806C-93E1C27F1929}" dt="2024-01-25T10:19:44.220" v="11" actId="1076"/>
+        <pc:sldMkLst>
+          <pc:docMk/>
+          <pc:sldMk cId="3985704815" sldId="270"/>
+        </pc:sldMkLst>
+        <pc:spChg chg="mod">
+          <ac:chgData name="Ihor Aleksandrov" userId="c3051032-6b87-4db2-b257-777a0106fbd9" providerId="ADAL" clId="{D05EAF56-C8F0-4612-806C-93E1C27F1929}" dt="2024-01-25T10:19:15.861" v="6"/>
+          <ac:spMkLst>
+            <pc:docMk/>
+            <pc:sldMk cId="3985704815" sldId="270"/>
+            <ac:spMk id="2" creationId="{53C5D828-9666-E312-B574-9FE965A7D6BE}"/>
+          </ac:spMkLst>
+        </pc:spChg>
+        <pc:picChg chg="add mod">
+          <ac:chgData name="Ihor Aleksandrov" userId="c3051032-6b87-4db2-b257-777a0106fbd9" providerId="ADAL" clId="{D05EAF56-C8F0-4612-806C-93E1C27F1929}" dt="2024-01-25T10:19:44.220" v="11" actId="1076"/>
+          <ac:picMkLst>
+            <pc:docMk/>
+            <pc:sldMk cId="3985704815" sldId="270"/>
+            <ac:picMk id="5" creationId="{329D80B6-A19C-F87F-FE85-78E58BE79DFC}"/>
+          </ac:picMkLst>
+        </pc:picChg>
+        <pc:picChg chg="del">
+          <ac:chgData name="Ihor Aleksandrov" userId="c3051032-6b87-4db2-b257-777a0106fbd9" providerId="ADAL" clId="{D05EAF56-C8F0-4612-806C-93E1C27F1929}" dt="2024-01-25T10:19:18.657" v="7" actId="478"/>
+          <ac:picMkLst>
+            <pc:docMk/>
+            <pc:sldMk cId="3985704815" sldId="270"/>
+            <ac:picMk id="6" creationId="{BDB4DD57-1DD7-48B1-ABFB-EE3016703034}"/>
+          </ac:picMkLst>
+        </pc:picChg>
+      </pc:sldChg>
+      <pc:sldChg chg="addSp delSp modSp add mod">
+        <pc:chgData name="Ihor Aleksandrov" userId="c3051032-6b87-4db2-b257-777a0106fbd9" providerId="ADAL" clId="{D05EAF56-C8F0-4612-806C-93E1C27F1929}" dt="2024-01-25T10:21:34.770" v="23" actId="1076"/>
+        <pc:sldMkLst>
+          <pc:docMk/>
+          <pc:sldMk cId="2117969225" sldId="271"/>
+        </pc:sldMkLst>
+        <pc:spChg chg="mod">
+          <ac:chgData name="Ihor Aleksandrov" userId="c3051032-6b87-4db2-b257-777a0106fbd9" providerId="ADAL" clId="{D05EAF56-C8F0-4612-806C-93E1C27F1929}" dt="2024-01-25T10:20:53.128" v="15"/>
+          <ac:spMkLst>
+            <pc:docMk/>
+            <pc:sldMk cId="2117969225" sldId="271"/>
+            <ac:spMk id="2" creationId="{53C5D828-9666-E312-B574-9FE965A7D6BE}"/>
+          </ac:spMkLst>
+        </pc:spChg>
+        <pc:picChg chg="del">
+          <ac:chgData name="Ihor Aleksandrov" userId="c3051032-6b87-4db2-b257-777a0106fbd9" providerId="ADAL" clId="{D05EAF56-C8F0-4612-806C-93E1C27F1929}" dt="2024-01-25T10:21:32.921" v="22" actId="478"/>
+          <ac:picMkLst>
+            <pc:docMk/>
+            <pc:sldMk cId="2117969225" sldId="271"/>
+            <ac:picMk id="5" creationId="{329D80B6-A19C-F87F-FE85-78E58BE79DFC}"/>
+          </ac:picMkLst>
+        </pc:picChg>
+        <pc:picChg chg="add mod">
+          <ac:chgData name="Ihor Aleksandrov" userId="c3051032-6b87-4db2-b257-777a0106fbd9" providerId="ADAL" clId="{D05EAF56-C8F0-4612-806C-93E1C27F1929}" dt="2024-01-25T10:21:34.770" v="23" actId="1076"/>
+          <ac:picMkLst>
+            <pc:docMk/>
+            <pc:sldMk cId="2117969225" sldId="271"/>
+            <ac:picMk id="6" creationId="{4FAB23B6-5773-62B9-EF9A-E1E0562BE8E1}"/>
+          </ac:picMkLst>
+        </pc:picChg>
+      </pc:sldChg>
+      <pc:sldChg chg="addSp delSp modSp add mod">
+        <pc:chgData name="Ihor Aleksandrov" userId="c3051032-6b87-4db2-b257-777a0106fbd9" providerId="ADAL" clId="{D05EAF56-C8F0-4612-806C-93E1C27F1929}" dt="2024-01-25T10:22:58.698" v="32" actId="1076"/>
+        <pc:sldMkLst>
+          <pc:docMk/>
+          <pc:sldMk cId="1169417950" sldId="272"/>
+        </pc:sldMkLst>
+        <pc:spChg chg="mod">
+          <ac:chgData name="Ihor Aleksandrov" userId="c3051032-6b87-4db2-b257-777a0106fbd9" providerId="ADAL" clId="{D05EAF56-C8F0-4612-806C-93E1C27F1929}" dt="2024-01-25T10:22:37.334" v="27"/>
+          <ac:spMkLst>
+            <pc:docMk/>
+            <pc:sldMk cId="1169417950" sldId="272"/>
+            <ac:spMk id="2" creationId="{53C5D828-9666-E312-B574-9FE965A7D6BE}"/>
+          </ac:spMkLst>
+        </pc:spChg>
+        <pc:picChg chg="add mod">
+          <ac:chgData name="Ihor Aleksandrov" userId="c3051032-6b87-4db2-b257-777a0106fbd9" providerId="ADAL" clId="{D05EAF56-C8F0-4612-806C-93E1C27F1929}" dt="2024-01-25T10:22:58.698" v="32" actId="1076"/>
+          <ac:picMkLst>
+            <pc:docMk/>
+            <pc:sldMk cId="1169417950" sldId="272"/>
+            <ac:picMk id="5" creationId="{2673936C-DF0C-E6AF-ABCB-83A1EB8FE594}"/>
+          </ac:picMkLst>
+        </pc:picChg>
+        <pc:picChg chg="del">
+          <ac:chgData name="Ihor Aleksandrov" userId="c3051032-6b87-4db2-b257-777a0106fbd9" providerId="ADAL" clId="{D05EAF56-C8F0-4612-806C-93E1C27F1929}" dt="2024-01-25T10:22:48.916" v="28" actId="478"/>
+          <ac:picMkLst>
+            <pc:docMk/>
+            <pc:sldMk cId="1169417950" sldId="272"/>
+            <ac:picMk id="6" creationId="{4FAB23B6-5773-62B9-EF9A-E1E0562BE8E1}"/>
+          </ac:picMkLst>
+        </pc:picChg>
+      </pc:sldChg>
+      <pc:sldChg chg="addSp delSp modSp add mod">
+        <pc:chgData name="Ihor Aleksandrov" userId="c3051032-6b87-4db2-b257-777a0106fbd9" providerId="ADAL" clId="{D05EAF56-C8F0-4612-806C-93E1C27F1929}" dt="2024-01-25T10:24:25.717" v="41" actId="1076"/>
+        <pc:sldMkLst>
+          <pc:docMk/>
+          <pc:sldMk cId="22639359" sldId="273"/>
+        </pc:sldMkLst>
+        <pc:spChg chg="mod">
+          <ac:chgData name="Ihor Aleksandrov" userId="c3051032-6b87-4db2-b257-777a0106fbd9" providerId="ADAL" clId="{D05EAF56-C8F0-4612-806C-93E1C27F1929}" dt="2024-01-25T10:24:04.948" v="36"/>
+          <ac:spMkLst>
+            <pc:docMk/>
+            <pc:sldMk cId="22639359" sldId="273"/>
+            <ac:spMk id="2" creationId="{53C5D828-9666-E312-B574-9FE965A7D6BE}"/>
+          </ac:spMkLst>
+        </pc:spChg>
+        <pc:picChg chg="del">
+          <ac:chgData name="Ihor Aleksandrov" userId="c3051032-6b87-4db2-b257-777a0106fbd9" providerId="ADAL" clId="{D05EAF56-C8F0-4612-806C-93E1C27F1929}" dt="2024-01-25T10:24:16.672" v="37" actId="478"/>
+          <ac:picMkLst>
+            <pc:docMk/>
+            <pc:sldMk cId="22639359" sldId="273"/>
+            <ac:picMk id="5" creationId="{2673936C-DF0C-E6AF-ABCB-83A1EB8FE594}"/>
+          </ac:picMkLst>
+        </pc:picChg>
+        <pc:picChg chg="add mod">
+          <ac:chgData name="Ihor Aleksandrov" userId="c3051032-6b87-4db2-b257-777a0106fbd9" providerId="ADAL" clId="{D05EAF56-C8F0-4612-806C-93E1C27F1929}" dt="2024-01-25T10:24:25.717" v="41" actId="1076"/>
+          <ac:picMkLst>
+            <pc:docMk/>
+            <pc:sldMk cId="22639359" sldId="273"/>
+            <ac:picMk id="6" creationId="{F57DB18D-BCA3-CA46-401F-99D6D9BB7754}"/>
+          </ac:picMkLst>
+        </pc:picChg>
+      </pc:sldChg>
+      <pc:sldChg chg="addSp delSp modSp add mod">
+        <pc:chgData name="Ihor Aleksandrov" userId="c3051032-6b87-4db2-b257-777a0106fbd9" providerId="ADAL" clId="{D05EAF56-C8F0-4612-806C-93E1C27F1929}" dt="2024-01-25T10:26:48.038" v="50" actId="1076"/>
+        <pc:sldMkLst>
+          <pc:docMk/>
+          <pc:sldMk cId="2169937468" sldId="274"/>
+        </pc:sldMkLst>
+        <pc:spChg chg="mod">
+          <ac:chgData name="Ihor Aleksandrov" userId="c3051032-6b87-4db2-b257-777a0106fbd9" providerId="ADAL" clId="{D05EAF56-C8F0-4612-806C-93E1C27F1929}" dt="2024-01-25T10:26:26.621" v="45"/>
+          <ac:spMkLst>
+            <pc:docMk/>
+            <pc:sldMk cId="2169937468" sldId="274"/>
+            <ac:spMk id="2" creationId="{53C5D828-9666-E312-B574-9FE965A7D6BE}"/>
+          </ac:spMkLst>
+        </pc:spChg>
+        <pc:picChg chg="add mod">
+          <ac:chgData name="Ihor Aleksandrov" userId="c3051032-6b87-4db2-b257-777a0106fbd9" providerId="ADAL" clId="{D05EAF56-C8F0-4612-806C-93E1C27F1929}" dt="2024-01-25T10:26:48.038" v="50" actId="1076"/>
+          <ac:picMkLst>
+            <pc:docMk/>
+            <pc:sldMk cId="2169937468" sldId="274"/>
+            <ac:picMk id="5" creationId="{9A572A88-7842-99D5-9802-EEA8606516CC}"/>
+          </ac:picMkLst>
+        </pc:picChg>
+        <pc:picChg chg="del">
+          <ac:chgData name="Ihor Aleksandrov" userId="c3051032-6b87-4db2-b257-777a0106fbd9" providerId="ADAL" clId="{D05EAF56-C8F0-4612-806C-93E1C27F1929}" dt="2024-01-25T10:26:41.517" v="48" actId="478"/>
+          <ac:picMkLst>
+            <pc:docMk/>
+            <pc:sldMk cId="2169937468" sldId="274"/>
+            <ac:picMk id="6" creationId="{F57DB18D-BCA3-CA46-401F-99D6D9BB7754}"/>
+          </ac:picMkLst>
+        </pc:picChg>
+      </pc:sldChg>
+      <pc:sldChg chg="addSp delSp modSp add mod">
+        <pc:chgData name="Ihor Aleksandrov" userId="c3051032-6b87-4db2-b257-777a0106fbd9" providerId="ADAL" clId="{D05EAF56-C8F0-4612-806C-93E1C27F1929}" dt="2024-01-25T10:28:26.836" v="62" actId="1076"/>
+        <pc:sldMkLst>
+          <pc:docMk/>
+          <pc:sldMk cId="3976992233" sldId="275"/>
+        </pc:sldMkLst>
+        <pc:spChg chg="mod">
+          <ac:chgData name="Ihor Aleksandrov" userId="c3051032-6b87-4db2-b257-777a0106fbd9" providerId="ADAL" clId="{D05EAF56-C8F0-4612-806C-93E1C27F1929}" dt="2024-01-25T10:28:02.805" v="55" actId="27636"/>
+          <ac:spMkLst>
+            <pc:docMk/>
+            <pc:sldMk cId="3976992233" sldId="275"/>
+            <ac:spMk id="2" creationId="{53C5D828-9666-E312-B574-9FE965A7D6BE}"/>
+          </ac:spMkLst>
+        </pc:spChg>
+        <pc:picChg chg="del">
+          <ac:chgData name="Ihor Aleksandrov" userId="c3051032-6b87-4db2-b257-777a0106fbd9" providerId="ADAL" clId="{D05EAF56-C8F0-4612-806C-93E1C27F1929}" dt="2024-01-25T10:28:04.538" v="56" actId="478"/>
+          <ac:picMkLst>
+            <pc:docMk/>
+            <pc:sldMk cId="3976992233" sldId="275"/>
+            <ac:picMk id="5" creationId="{9A572A88-7842-99D5-9802-EEA8606516CC}"/>
+          </ac:picMkLst>
+        </pc:picChg>
+        <pc:picChg chg="add mod">
+          <ac:chgData name="Ihor Aleksandrov" userId="c3051032-6b87-4db2-b257-777a0106fbd9" providerId="ADAL" clId="{D05EAF56-C8F0-4612-806C-93E1C27F1929}" dt="2024-01-25T10:28:26.836" v="62" actId="1076"/>
+          <ac:picMkLst>
+            <pc:docMk/>
+            <pc:sldMk cId="3976992233" sldId="275"/>
+            <ac:picMk id="6" creationId="{76FE2D85-671A-24B1-C1D7-52F796E16C69}"/>
+          </ac:picMkLst>
+        </pc:picChg>
+      </pc:sldChg>
+      <pc:sldChg chg="addSp delSp modSp add mod ord">
+        <pc:chgData name="Ihor Aleksandrov" userId="c3051032-6b87-4db2-b257-777a0106fbd9" providerId="ADAL" clId="{D05EAF56-C8F0-4612-806C-93E1C27F1929}" dt="2024-01-25T10:48:12.411" v="112"/>
+        <pc:sldMkLst>
+          <pc:docMk/>
+          <pc:sldMk cId="2135561016" sldId="276"/>
+        </pc:sldMkLst>
+        <pc:spChg chg="mod">
+          <ac:chgData name="Ihor Aleksandrov" userId="c3051032-6b87-4db2-b257-777a0106fbd9" providerId="ADAL" clId="{D05EAF56-C8F0-4612-806C-93E1C27F1929}" dt="2024-01-25T10:32:37.109" v="72"/>
+          <ac:spMkLst>
+            <pc:docMk/>
+            <pc:sldMk cId="2135561016" sldId="276"/>
+            <ac:spMk id="2" creationId="{18C18207-A109-5552-1541-0ABBAA316282}"/>
+          </ac:spMkLst>
+        </pc:spChg>
+        <pc:spChg chg="del">
+          <ac:chgData name="Ihor Aleksandrov" userId="c3051032-6b87-4db2-b257-777a0106fbd9" providerId="ADAL" clId="{D05EAF56-C8F0-4612-806C-93E1C27F1929}" dt="2024-01-25T10:46:20.989" v="100" actId="478"/>
+          <ac:spMkLst>
+            <pc:docMk/>
+            <pc:sldMk cId="2135561016" sldId="276"/>
+            <ac:spMk id="3" creationId="{3473E1D3-7401-AD94-5C7A-49912FA8005A}"/>
+          </ac:spMkLst>
+        </pc:spChg>
+        <pc:picChg chg="add mod">
+          <ac:chgData name="Ihor Aleksandrov" userId="c3051032-6b87-4db2-b257-777a0106fbd9" providerId="ADAL" clId="{D05EAF56-C8F0-4612-806C-93E1C27F1929}" dt="2024-01-25T10:48:12.411" v="112"/>
+          <ac:picMkLst>
+            <pc:docMk/>
+            <pc:sldMk cId="2135561016" sldId="276"/>
+            <ac:picMk id="6" creationId="{BA86DDBB-D80D-1005-2EB0-33056830C288}"/>
+          </ac:picMkLst>
+        </pc:picChg>
+      </pc:sldChg>
+      <pc:sldChg chg="addSp delSp modSp add mod ord">
+        <pc:chgData name="Ihor Aleksandrov" userId="c3051032-6b87-4db2-b257-777a0106fbd9" providerId="ADAL" clId="{D05EAF56-C8F0-4612-806C-93E1C27F1929}" dt="2024-01-25T10:35:32.671" v="88" actId="1076"/>
+        <pc:sldMkLst>
+          <pc:docMk/>
+          <pc:sldMk cId="3216895555" sldId="277"/>
+        </pc:sldMkLst>
+        <pc:spChg chg="mod">
+          <ac:chgData name="Ihor Aleksandrov" userId="c3051032-6b87-4db2-b257-777a0106fbd9" providerId="ADAL" clId="{D05EAF56-C8F0-4612-806C-93E1C27F1929}" dt="2024-01-25T10:34:55.016" v="80" actId="27636"/>
+          <ac:spMkLst>
+            <pc:docMk/>
+            <pc:sldMk cId="3216895555" sldId="277"/>
+            <ac:spMk id="2" creationId="{53C5D828-9666-E312-B574-9FE965A7D6BE}"/>
+          </ac:spMkLst>
+        </pc:spChg>
+        <pc:picChg chg="add mod">
+          <ac:chgData name="Ihor Aleksandrov" userId="c3051032-6b87-4db2-b257-777a0106fbd9" providerId="ADAL" clId="{D05EAF56-C8F0-4612-806C-93E1C27F1929}" dt="2024-01-25T10:35:32.671" v="88" actId="1076"/>
+          <ac:picMkLst>
+            <pc:docMk/>
+            <pc:sldMk cId="3216895555" sldId="277"/>
+            <ac:picMk id="5" creationId="{523B5826-3FED-E033-7A50-454B720EF960}"/>
+          </ac:picMkLst>
+        </pc:picChg>
+        <pc:picChg chg="del">
+          <ac:chgData name="Ihor Aleksandrov" userId="c3051032-6b87-4db2-b257-777a0106fbd9" providerId="ADAL" clId="{D05EAF56-C8F0-4612-806C-93E1C27F1929}" dt="2024-01-25T10:35:17.826" v="82" actId="478"/>
+          <ac:picMkLst>
+            <pc:docMk/>
+            <pc:sldMk cId="3216895555" sldId="277"/>
+            <ac:picMk id="6" creationId="{76FE2D85-671A-24B1-C1D7-52F796E16C69}"/>
+          </ac:picMkLst>
+        </pc:picChg>
+      </pc:sldChg>
+      <pc:sldChg chg="addSp delSp modSp add mod">
+        <pc:chgData name="Ihor Aleksandrov" userId="c3051032-6b87-4db2-b257-777a0106fbd9" providerId="ADAL" clId="{D05EAF56-C8F0-4612-806C-93E1C27F1929}" dt="2024-01-25T10:43:44.832" v="99" actId="1076"/>
+        <pc:sldMkLst>
+          <pc:docMk/>
+          <pc:sldMk cId="1506611494" sldId="278"/>
+        </pc:sldMkLst>
+        <pc:spChg chg="mod">
+          <ac:chgData name="Ihor Aleksandrov" userId="c3051032-6b87-4db2-b257-777a0106fbd9" providerId="ADAL" clId="{D05EAF56-C8F0-4612-806C-93E1C27F1929}" dt="2024-01-25T10:40:14.102" v="94"/>
+          <ac:spMkLst>
+            <pc:docMk/>
+            <pc:sldMk cId="1506611494" sldId="278"/>
+            <ac:spMk id="2" creationId="{53C5D828-9666-E312-B574-9FE965A7D6BE}"/>
+          </ac:spMkLst>
+        </pc:spChg>
+        <pc:picChg chg="del">
+          <ac:chgData name="Ihor Aleksandrov" userId="c3051032-6b87-4db2-b257-777a0106fbd9" providerId="ADAL" clId="{D05EAF56-C8F0-4612-806C-93E1C27F1929}" dt="2024-01-25T10:43:36.501" v="95" actId="478"/>
+          <ac:picMkLst>
+            <pc:docMk/>
+            <pc:sldMk cId="1506611494" sldId="278"/>
+            <ac:picMk id="5" creationId="{523B5826-3FED-E033-7A50-454B720EF960}"/>
+          </ac:picMkLst>
+        </pc:picChg>
+        <pc:picChg chg="add mod">
+          <ac:chgData name="Ihor Aleksandrov" userId="c3051032-6b87-4db2-b257-777a0106fbd9" providerId="ADAL" clId="{D05EAF56-C8F0-4612-806C-93E1C27F1929}" dt="2024-01-25T10:43:44.832" v="99" actId="1076"/>
+          <ac:picMkLst>
+            <pc:docMk/>
+            <pc:sldMk cId="1506611494" sldId="278"/>
+            <ac:picMk id="6" creationId="{F7B4799B-BEB4-BC82-1CD6-CE4E3725E9A6}"/>
+          </ac:picMkLst>
+        </pc:picChg>
+      </pc:sldChg>
+      <pc:sldChg chg="addSp delSp modSp add mod">
+        <pc:chgData name="Ihor Aleksandrov" userId="c3051032-6b87-4db2-b257-777a0106fbd9" providerId="ADAL" clId="{D05EAF56-C8F0-4612-806C-93E1C27F1929}" dt="2024-01-25T10:49:48.310" v="120"/>
+        <pc:sldMkLst>
+          <pc:docMk/>
+          <pc:sldMk cId="3864832451" sldId="279"/>
+        </pc:sldMkLst>
+        <pc:spChg chg="mod">
+          <ac:chgData name="Ihor Aleksandrov" userId="c3051032-6b87-4db2-b257-777a0106fbd9" providerId="ADAL" clId="{D05EAF56-C8F0-4612-806C-93E1C27F1929}" dt="2024-01-25T10:49:48.310" v="120"/>
+          <ac:spMkLst>
+            <pc:docMk/>
+            <pc:sldMk cId="3864832451" sldId="279"/>
+            <ac:spMk id="2" creationId="{53C5D828-9666-E312-B574-9FE965A7D6BE}"/>
+          </ac:spMkLst>
+        </pc:spChg>
+        <pc:picChg chg="add mod">
+          <ac:chgData name="Ihor Aleksandrov" userId="c3051032-6b87-4db2-b257-777a0106fbd9" providerId="ADAL" clId="{D05EAF56-C8F0-4612-806C-93E1C27F1929}" dt="2024-01-25T10:49:09.073" v="117" actId="1076"/>
+          <ac:picMkLst>
+            <pc:docMk/>
+            <pc:sldMk cId="3864832451" sldId="279"/>
+            <ac:picMk id="5" creationId="{C7472C97-E950-C6C2-19AE-07ECFA5C4C69}"/>
+          </ac:picMkLst>
+        </pc:picChg>
+        <pc:picChg chg="del">
+          <ac:chgData name="Ihor Aleksandrov" userId="c3051032-6b87-4db2-b257-777a0106fbd9" providerId="ADAL" clId="{D05EAF56-C8F0-4612-806C-93E1C27F1929}" dt="2024-01-25T10:48:53.887" v="114" actId="478"/>
+          <ac:picMkLst>
+            <pc:docMk/>
+            <pc:sldMk cId="3864832451" sldId="279"/>
+            <ac:picMk id="6" creationId="{F7B4799B-BEB4-BC82-1CD6-CE4E3725E9A6}"/>
+          </ac:picMkLst>
+        </pc:picChg>
+      </pc:sldChg>
+      <pc:sldChg chg="addSp delSp modSp add mod">
+        <pc:chgData name="Ihor Aleksandrov" userId="c3051032-6b87-4db2-b257-777a0106fbd9" providerId="ADAL" clId="{D05EAF56-C8F0-4612-806C-93E1C27F1929}" dt="2024-01-25T10:51:39.984" v="127" actId="1076"/>
+        <pc:sldMkLst>
+          <pc:docMk/>
+          <pc:sldMk cId="2194478224" sldId="280"/>
+        </pc:sldMkLst>
+        <pc:spChg chg="mod">
+          <ac:chgData name="Ihor Aleksandrov" userId="c3051032-6b87-4db2-b257-777a0106fbd9" providerId="ADAL" clId="{D05EAF56-C8F0-4612-806C-93E1C27F1929}" dt="2024-01-25T10:51:25.127" v="124"/>
+          <ac:spMkLst>
+            <pc:docMk/>
+            <pc:sldMk cId="2194478224" sldId="280"/>
+            <ac:spMk id="2" creationId="{53C5D828-9666-E312-B574-9FE965A7D6BE}"/>
+          </ac:spMkLst>
+        </pc:spChg>
+        <pc:picChg chg="add mod">
+          <ac:chgData name="Ihor Aleksandrov" userId="c3051032-6b87-4db2-b257-777a0106fbd9" providerId="ADAL" clId="{D05EAF56-C8F0-4612-806C-93E1C27F1929}" dt="2024-01-25T10:51:39.984" v="127" actId="1076"/>
+          <ac:picMkLst>
+            <pc:docMk/>
+            <pc:sldMk cId="2194478224" sldId="280"/>
+            <ac:picMk id="4" creationId="{8F2E114A-EFDE-8D45-E482-1B0918ACBF79}"/>
+          </ac:picMkLst>
+        </pc:picChg>
+        <pc:picChg chg="del">
+          <ac:chgData name="Ihor Aleksandrov" userId="c3051032-6b87-4db2-b257-777a0106fbd9" providerId="ADAL" clId="{D05EAF56-C8F0-4612-806C-93E1C27F1929}" dt="2024-01-25T10:51:26.612" v="125" actId="478"/>
+          <ac:picMkLst>
+            <pc:docMk/>
+            <pc:sldMk cId="2194478224" sldId="280"/>
+            <ac:picMk id="5" creationId="{C7472C97-E950-C6C2-19AE-07ECFA5C4C69}"/>
+          </ac:picMkLst>
+        </pc:picChg>
+      </pc:sldChg>
+      <pc:sldChg chg="delSp modSp add mod ord">
+        <pc:chgData name="Ihor Aleksandrov" userId="c3051032-6b87-4db2-b257-777a0106fbd9" providerId="ADAL" clId="{D05EAF56-C8F0-4612-806C-93E1C27F1929}" dt="2024-01-25T10:53:57.961" v="142" actId="20577"/>
+        <pc:sldMkLst>
+          <pc:docMk/>
+          <pc:sldMk cId="2205366352" sldId="281"/>
+        </pc:sldMkLst>
+        <pc:spChg chg="mod">
+          <ac:chgData name="Ihor Aleksandrov" userId="c3051032-6b87-4db2-b257-777a0106fbd9" providerId="ADAL" clId="{D05EAF56-C8F0-4612-806C-93E1C27F1929}" dt="2024-01-25T10:53:57.961" v="142" actId="20577"/>
+          <ac:spMkLst>
+            <pc:docMk/>
+            <pc:sldMk cId="2205366352" sldId="281"/>
+            <ac:spMk id="2" creationId="{18C18207-A109-5552-1541-0ABBAA316282}"/>
+          </ac:spMkLst>
+        </pc:spChg>
+        <pc:picChg chg="del">
+          <ac:chgData name="Ihor Aleksandrov" userId="c3051032-6b87-4db2-b257-777a0106fbd9" providerId="ADAL" clId="{D05EAF56-C8F0-4612-806C-93E1C27F1929}" dt="2024-01-25T10:53:50.795" v="134" actId="478"/>
+          <ac:picMkLst>
+            <pc:docMk/>
+            <pc:sldMk cId="2205366352" sldId="281"/>
+            <ac:picMk id="6" creationId="{BA86DDBB-D80D-1005-2EB0-33056830C288}"/>
+          </ac:picMkLst>
+        </pc:picChg>
+      </pc:sldChg>
+      <pc:sldChg chg="delSp add del setBg delDesignElem">
+        <pc:chgData name="Ihor Aleksandrov" userId="c3051032-6b87-4db2-b257-777a0106fbd9" providerId="ADAL" clId="{D05EAF56-C8F0-4612-806C-93E1C27F1929}" dt="2024-01-25T10:53:38.779" v="130" actId="47"/>
+        <pc:sldMkLst>
+          <pc:docMk/>
+          <pc:sldMk cId="2518075034" sldId="281"/>
+        </pc:sldMkLst>
+        <pc:spChg chg="del">
+          <ac:chgData name="Ihor Aleksandrov" userId="c3051032-6b87-4db2-b257-777a0106fbd9" providerId="ADAL" clId="{D05EAF56-C8F0-4612-806C-93E1C27F1929}" dt="2024-01-25T10:53:27.044" v="129"/>
+          <ac:spMkLst>
+            <pc:docMk/>
+            <pc:sldMk cId="2518075034" sldId="281"/>
+            <ac:spMk id="9" creationId="{C3896A03-3945-419A-B66B-4EE266EDD152}"/>
+          </ac:spMkLst>
+        </pc:spChg>
+        <pc:spChg chg="del">
+          <ac:chgData name="Ihor Aleksandrov" userId="c3051032-6b87-4db2-b257-777a0106fbd9" providerId="ADAL" clId="{D05EAF56-C8F0-4612-806C-93E1C27F1929}" dt="2024-01-25T10:53:27.044" v="129"/>
+          <ac:spMkLst>
+            <pc:docMk/>
+            <pc:sldMk cId="2518075034" sldId="281"/>
+            <ac:spMk id="11" creationId="{B34F5AD2-EDBD-4BBD-A55C-EAFFD0C7097A}"/>
+          </ac:spMkLst>
+        </pc:spChg>
+      </pc:sldChg>
+      <pc:sldChg chg="modSp add mod ord">
+        <pc:chgData name="Ihor Aleksandrov" userId="c3051032-6b87-4db2-b257-777a0106fbd9" providerId="ADAL" clId="{D05EAF56-C8F0-4612-806C-93E1C27F1929}" dt="2024-01-25T10:55:39.680" v="152" actId="20577"/>
+        <pc:sldMkLst>
+          <pc:docMk/>
+          <pc:sldMk cId="2028152352" sldId="282"/>
+        </pc:sldMkLst>
+        <pc:spChg chg="mod">
+          <ac:chgData name="Ihor Aleksandrov" userId="c3051032-6b87-4db2-b257-777a0106fbd9" providerId="ADAL" clId="{D05EAF56-C8F0-4612-806C-93E1C27F1929}" dt="2024-01-25T10:55:39.680" v="152" actId="20577"/>
+          <ac:spMkLst>
+            <pc:docMk/>
+            <pc:sldMk cId="2028152352" sldId="282"/>
+            <ac:spMk id="2" creationId="{18C18207-A109-5552-1541-0ABBAA316282}"/>
+          </ac:spMkLst>
+        </pc:spChg>
+      </pc:sldChg>
+      <pc:sldChg chg="modSp add mod ord">
+        <pc:chgData name="Ihor Aleksandrov" userId="c3051032-6b87-4db2-b257-777a0106fbd9" providerId="ADAL" clId="{D05EAF56-C8F0-4612-806C-93E1C27F1929}" dt="2024-01-25T11:01:05.747" v="171"/>
+        <pc:sldMkLst>
+          <pc:docMk/>
+          <pc:sldMk cId="2433051637" sldId="283"/>
+        </pc:sldMkLst>
+        <pc:spChg chg="mod">
+          <ac:chgData name="Ihor Aleksandrov" userId="c3051032-6b87-4db2-b257-777a0106fbd9" providerId="ADAL" clId="{D05EAF56-C8F0-4612-806C-93E1C27F1929}" dt="2024-01-25T11:01:05.747" v="171"/>
+          <ac:spMkLst>
+            <pc:docMk/>
+            <pc:sldMk cId="2433051637" sldId="283"/>
+            <ac:spMk id="2" creationId="{53C5D828-9666-E312-B574-9FE965A7D6BE}"/>
+          </ac:spMkLst>
+        </pc:spChg>
+      </pc:sldChg>
+      <pc:sldChg chg="addSp delSp modSp add mod">
+        <pc:chgData name="Ihor Aleksandrov" userId="c3051032-6b87-4db2-b257-777a0106fbd9" providerId="ADAL" clId="{D05EAF56-C8F0-4612-806C-93E1C27F1929}" dt="2024-01-25T11:22:22.700" v="219" actId="14100"/>
+        <pc:sldMkLst>
+          <pc:docMk/>
+          <pc:sldMk cId="2869825701" sldId="284"/>
+        </pc:sldMkLst>
+        <pc:spChg chg="mod">
+          <ac:chgData name="Ihor Aleksandrov" userId="c3051032-6b87-4db2-b257-777a0106fbd9" providerId="ADAL" clId="{D05EAF56-C8F0-4612-806C-93E1C27F1929}" dt="2024-01-25T11:01:51.992" v="175"/>
+          <ac:spMkLst>
+            <pc:docMk/>
+            <pc:sldMk cId="2869825701" sldId="284"/>
+            <ac:spMk id="2" creationId="{53C5D828-9666-E312-B574-9FE965A7D6BE}"/>
+          </ac:spMkLst>
+        </pc:spChg>
+        <pc:spChg chg="del">
+          <ac:chgData name="Ihor Aleksandrov" userId="c3051032-6b87-4db2-b257-777a0106fbd9" providerId="ADAL" clId="{D05EAF56-C8F0-4612-806C-93E1C27F1929}" dt="2024-01-25T11:22:01.808" v="214" actId="478"/>
+          <ac:spMkLst>
+            <pc:docMk/>
+            <pc:sldMk cId="2869825701" sldId="284"/>
+            <ac:spMk id="6" creationId="{E04F08BD-B70E-B1A8-7328-EE29B18E4AA1}"/>
+          </ac:spMkLst>
+        </pc:spChg>
+        <pc:picChg chg="add mod">
+          <ac:chgData name="Ihor Aleksandrov" userId="c3051032-6b87-4db2-b257-777a0106fbd9" providerId="ADAL" clId="{D05EAF56-C8F0-4612-806C-93E1C27F1929}" dt="2024-01-25T11:22:22.700" v="219" actId="14100"/>
+          <ac:picMkLst>
+            <pc:docMk/>
+            <pc:sldMk cId="2869825701" sldId="284"/>
+            <ac:picMk id="5" creationId="{0885AC12-A488-3762-3217-E1B0319D46AD}"/>
+          </ac:picMkLst>
+        </pc:picChg>
+      </pc:sldChg>
+      <pc:sldChg chg="addSp delSp add del setBg delDesignElem">
+        <pc:chgData name="Ihor Aleksandrov" userId="c3051032-6b87-4db2-b257-777a0106fbd9" providerId="ADAL" clId="{D05EAF56-C8F0-4612-806C-93E1C27F1929}" dt="2024-01-25T11:00:55.998" v="168"/>
+        <pc:sldMkLst>
+          <pc:docMk/>
+          <pc:sldMk cId="3157685417" sldId="284"/>
+        </pc:sldMkLst>
+        <pc:spChg chg="add del">
+          <ac:chgData name="Ihor Aleksandrov" userId="c3051032-6b87-4db2-b257-777a0106fbd9" providerId="ADAL" clId="{D05EAF56-C8F0-4612-806C-93E1C27F1929}" dt="2024-01-25T11:00:55.998" v="168"/>
+          <ac:spMkLst>
+            <pc:docMk/>
+            <pc:sldMk cId="3157685417" sldId="284"/>
+            <ac:spMk id="9" creationId="{D4771268-CB57-404A-9271-370EB28F6090}"/>
+          </ac:spMkLst>
+        </pc:spChg>
+      </pc:sldChg>
+      <pc:sldChg chg="addSp delSp modSp add mod">
+        <pc:chgData name="Ihor Aleksandrov" userId="c3051032-6b87-4db2-b257-777a0106fbd9" providerId="ADAL" clId="{D05EAF56-C8F0-4612-806C-93E1C27F1929}" dt="2024-01-25T11:03:48.850" v="202" actId="1036"/>
+        <pc:sldMkLst>
+          <pc:docMk/>
+          <pc:sldMk cId="856240837" sldId="285"/>
+        </pc:sldMkLst>
+        <pc:spChg chg="mod">
+          <ac:chgData name="Ihor Aleksandrov" userId="c3051032-6b87-4db2-b257-777a0106fbd9" providerId="ADAL" clId="{D05EAF56-C8F0-4612-806C-93E1C27F1929}" dt="2024-01-25T11:03:18.596" v="177"/>
+          <ac:spMkLst>
+            <pc:docMk/>
+            <pc:sldMk cId="856240837" sldId="285"/>
+            <ac:spMk id="2" creationId="{53C5D828-9666-E312-B574-9FE965A7D6BE}"/>
+          </ac:spMkLst>
+        </pc:spChg>
+        <pc:spChg chg="del">
+          <ac:chgData name="Ihor Aleksandrov" userId="c3051032-6b87-4db2-b257-777a0106fbd9" providerId="ADAL" clId="{D05EAF56-C8F0-4612-806C-93E1C27F1929}" dt="2024-01-25T11:03:21.592" v="178" actId="478"/>
+          <ac:spMkLst>
+            <pc:docMk/>
+            <pc:sldMk cId="856240837" sldId="285"/>
+            <ac:spMk id="6" creationId="{E04F08BD-B70E-B1A8-7328-EE29B18E4AA1}"/>
+          </ac:spMkLst>
+        </pc:spChg>
+        <pc:picChg chg="add mod">
+          <ac:chgData name="Ihor Aleksandrov" userId="c3051032-6b87-4db2-b257-777a0106fbd9" providerId="ADAL" clId="{D05EAF56-C8F0-4612-806C-93E1C27F1929}" dt="2024-01-25T11:03:48.850" v="202" actId="1036"/>
+          <ac:picMkLst>
+            <pc:docMk/>
+            <pc:sldMk cId="856240837" sldId="285"/>
+            <ac:picMk id="4" creationId="{A8C20435-8FF0-1341-85C4-558E352F27E5}"/>
+          </ac:picMkLst>
+        </pc:picChg>
+      </pc:sldChg>
+      <pc:sldChg chg="modSp add mod ord">
+        <pc:chgData name="Ihor Aleksandrov" userId="c3051032-6b87-4db2-b257-777a0106fbd9" providerId="ADAL" clId="{D05EAF56-C8F0-4612-806C-93E1C27F1929}" dt="2024-01-25T11:10:32.927" v="210"/>
+        <pc:sldMkLst>
+          <pc:docMk/>
+          <pc:sldMk cId="1586376586" sldId="286"/>
+        </pc:sldMkLst>
+        <pc:spChg chg="mod">
+          <ac:chgData name="Ihor Aleksandrov" userId="c3051032-6b87-4db2-b257-777a0106fbd9" providerId="ADAL" clId="{D05EAF56-C8F0-4612-806C-93E1C27F1929}" dt="2024-01-25T11:10:32.927" v="210"/>
+          <ac:spMkLst>
+            <pc:docMk/>
+            <pc:sldMk cId="1586376586" sldId="286"/>
+            <ac:spMk id="2" creationId="{53C5D828-9666-E312-B574-9FE965A7D6BE}"/>
+          </ac:spMkLst>
+        </pc:spChg>
+      </pc:sldChg>
+      <pc:sldChg chg="add del">
+        <pc:chgData name="Ihor Aleksandrov" userId="c3051032-6b87-4db2-b257-777a0106fbd9" providerId="ADAL" clId="{D05EAF56-C8F0-4612-806C-93E1C27F1929}" dt="2024-01-25T11:10:15.704" v="204" actId="2696"/>
+        <pc:sldMkLst>
+          <pc:docMk/>
+          <pc:sldMk cId="2392975250" sldId="286"/>
+        </pc:sldMkLst>
+      </pc:sldChg>
+      <pc:sldChg chg="modSp add mod ord">
+        <pc:chgData name="Ihor Aleksandrov" userId="c3051032-6b87-4db2-b257-777a0106fbd9" providerId="ADAL" clId="{D05EAF56-C8F0-4612-806C-93E1C27F1929}" dt="2024-01-25T11:27:00.546" v="224" actId="20577"/>
+        <pc:sldMkLst>
+          <pc:docMk/>
+          <pc:sldMk cId="2004498921" sldId="287"/>
+        </pc:sldMkLst>
+        <pc:spChg chg="mod">
+          <ac:chgData name="Ihor Aleksandrov" userId="c3051032-6b87-4db2-b257-777a0106fbd9" providerId="ADAL" clId="{D05EAF56-C8F0-4612-806C-93E1C27F1929}" dt="2024-01-25T11:27:00.546" v="224" actId="20577"/>
+          <ac:spMkLst>
+            <pc:docMk/>
+            <pc:sldMk cId="2004498921" sldId="287"/>
+            <ac:spMk id="2" creationId="{18C18207-A109-5552-1541-0ABBAA316282}"/>
+          </ac:spMkLst>
+        </pc:spChg>
+      </pc:sldChg>
+      <pc:sldChg chg="addSp delSp modSp add mod ord">
+        <pc:chgData name="Ihor Aleksandrov" userId="c3051032-6b87-4db2-b257-777a0106fbd9" providerId="ADAL" clId="{D05EAF56-C8F0-4612-806C-93E1C27F1929}" dt="2024-01-25T11:28:34.816" v="233" actId="1076"/>
+        <pc:sldMkLst>
+          <pc:docMk/>
+          <pc:sldMk cId="156474206" sldId="288"/>
+        </pc:sldMkLst>
+        <pc:spChg chg="mod">
+          <ac:chgData name="Ihor Aleksandrov" userId="c3051032-6b87-4db2-b257-777a0106fbd9" providerId="ADAL" clId="{D05EAF56-C8F0-4612-806C-93E1C27F1929}" dt="2024-01-25T11:28:25.547" v="230"/>
+          <ac:spMkLst>
+            <pc:docMk/>
+            <pc:sldMk cId="156474206" sldId="288"/>
+            <ac:spMk id="2" creationId="{53C5D828-9666-E312-B574-9FE965A7D6BE}"/>
+          </ac:spMkLst>
+        </pc:spChg>
+        <pc:spChg chg="del">
+          <ac:chgData name="Ihor Aleksandrov" userId="c3051032-6b87-4db2-b257-777a0106fbd9" providerId="ADAL" clId="{D05EAF56-C8F0-4612-806C-93E1C27F1929}" dt="2024-01-25T11:28:27.105" v="231" actId="478"/>
+          <ac:spMkLst>
+            <pc:docMk/>
+            <pc:sldMk cId="156474206" sldId="288"/>
+            <ac:spMk id="6" creationId="{E04F08BD-B70E-B1A8-7328-EE29B18E4AA1}"/>
+          </ac:spMkLst>
+        </pc:spChg>
+        <pc:picChg chg="add mod">
+          <ac:chgData name="Ihor Aleksandrov" userId="c3051032-6b87-4db2-b257-777a0106fbd9" providerId="ADAL" clId="{D05EAF56-C8F0-4612-806C-93E1C27F1929}" dt="2024-01-25T11:28:34.816" v="233" actId="1076"/>
+          <ac:picMkLst>
+            <pc:docMk/>
+            <pc:sldMk cId="156474206" sldId="288"/>
+            <ac:picMk id="4" creationId="{0D7416A8-5E31-A6F5-922C-BB434A29C3EE}"/>
+          </ac:picMkLst>
+        </pc:picChg>
+      </pc:sldChg>
+      <pc:sldChg chg="modSp add mod ord">
+        <pc:chgData name="Ihor Aleksandrov" userId="c3051032-6b87-4db2-b257-777a0106fbd9" providerId="ADAL" clId="{D05EAF56-C8F0-4612-806C-93E1C27F1929}" dt="2024-01-25T11:29:51.583" v="244"/>
+        <pc:sldMkLst>
+          <pc:docMk/>
+          <pc:sldMk cId="2551930029" sldId="289"/>
+        </pc:sldMkLst>
+        <pc:spChg chg="mod">
+          <ac:chgData name="Ihor Aleksandrov" userId="c3051032-6b87-4db2-b257-777a0106fbd9" providerId="ADAL" clId="{D05EAF56-C8F0-4612-806C-93E1C27F1929}" dt="2024-01-25T11:29:47.752" v="242" actId="20577"/>
+          <ac:spMkLst>
+            <pc:docMk/>
+            <pc:sldMk cId="2551930029" sldId="289"/>
+            <ac:spMk id="2" creationId="{18C18207-A109-5552-1541-0ABBAA316282}"/>
+          </ac:spMkLst>
+        </pc:spChg>
+      </pc:sldChg>
+      <pc:sldChg chg="addSp delSp modSp add mod ord">
+        <pc:chgData name="Ihor Aleksandrov" userId="c3051032-6b87-4db2-b257-777a0106fbd9" providerId="ADAL" clId="{D05EAF56-C8F0-4612-806C-93E1C27F1929}" dt="2024-01-25T11:49:38.267" v="257" actId="1076"/>
+        <pc:sldMkLst>
+          <pc:docMk/>
+          <pc:sldMk cId="1939738048" sldId="290"/>
+        </pc:sldMkLst>
+        <pc:spChg chg="mod">
+          <ac:chgData name="Ihor Aleksandrov" userId="c3051032-6b87-4db2-b257-777a0106fbd9" providerId="ADAL" clId="{D05EAF56-C8F0-4612-806C-93E1C27F1929}" dt="2024-01-25T11:49:07.853" v="250"/>
+          <ac:spMkLst>
+            <pc:docMk/>
+            <pc:sldMk cId="1939738048" sldId="290"/>
+            <ac:spMk id="2" creationId="{53C5D828-9666-E312-B574-9FE965A7D6BE}"/>
+          </ac:spMkLst>
+        </pc:spChg>
+        <pc:spChg chg="del">
+          <ac:chgData name="Ihor Aleksandrov" userId="c3051032-6b87-4db2-b257-777a0106fbd9" providerId="ADAL" clId="{D05EAF56-C8F0-4612-806C-93E1C27F1929}" dt="2024-01-25T11:49:20.582" v="251" actId="478"/>
+          <ac:spMkLst>
+            <pc:docMk/>
+            <pc:sldMk cId="1939738048" sldId="290"/>
+            <ac:spMk id="6" creationId="{E04F08BD-B70E-B1A8-7328-EE29B18E4AA1}"/>
+          </ac:spMkLst>
+        </pc:spChg>
+        <pc:picChg chg="add mod">
+          <ac:chgData name="Ihor Aleksandrov" userId="c3051032-6b87-4db2-b257-777a0106fbd9" providerId="ADAL" clId="{D05EAF56-C8F0-4612-806C-93E1C27F1929}" dt="2024-01-25T11:49:38.267" v="257" actId="1076"/>
+          <ac:picMkLst>
+            <pc:docMk/>
+            <pc:sldMk cId="1939738048" sldId="290"/>
+            <ac:picMk id="4" creationId="{49B21785-1E7E-8457-4FBF-E3FC2CCADD04}"/>
+          </ac:picMkLst>
+        </pc:picChg>
+      </pc:sldChg>
+      <pc:sldChg chg="modSp add mod ord">
+        <pc:chgData name="Ihor Aleksandrov" userId="c3051032-6b87-4db2-b257-777a0106fbd9" providerId="ADAL" clId="{D05EAF56-C8F0-4612-806C-93E1C27F1929}" dt="2024-01-25T11:51:45.959" v="263"/>
+        <pc:sldMkLst>
+          <pc:docMk/>
+          <pc:sldMk cId="1018496090" sldId="291"/>
+        </pc:sldMkLst>
+        <pc:spChg chg="mod">
+          <ac:chgData name="Ihor Aleksandrov" userId="c3051032-6b87-4db2-b257-777a0106fbd9" providerId="ADAL" clId="{D05EAF56-C8F0-4612-806C-93E1C27F1929}" dt="2024-01-25T11:51:45.959" v="263"/>
+          <ac:spMkLst>
+            <pc:docMk/>
+            <pc:sldMk cId="1018496090" sldId="291"/>
+            <ac:spMk id="2" creationId="{53C5D828-9666-E312-B574-9FE965A7D6BE}"/>
+          </ac:spMkLst>
+        </pc:spChg>
+      </pc:sldChg>
+      <pc:sldChg chg="modSp add mod">
+        <pc:chgData name="Ihor Aleksandrov" userId="c3051032-6b87-4db2-b257-777a0106fbd9" providerId="ADAL" clId="{D05EAF56-C8F0-4612-806C-93E1C27F1929}" dt="2024-01-25T11:53:09.928" v="267"/>
+        <pc:sldMkLst>
+          <pc:docMk/>
+          <pc:sldMk cId="2128635244" sldId="292"/>
+        </pc:sldMkLst>
+        <pc:spChg chg="mod">
+          <ac:chgData name="Ihor Aleksandrov" userId="c3051032-6b87-4db2-b257-777a0106fbd9" providerId="ADAL" clId="{D05EAF56-C8F0-4612-806C-93E1C27F1929}" dt="2024-01-25T11:53:09.928" v="267"/>
+          <ac:spMkLst>
+            <pc:docMk/>
+            <pc:sldMk cId="2128635244" sldId="292"/>
+            <ac:spMk id="2" creationId="{53C5D828-9666-E312-B574-9FE965A7D6BE}"/>
+          </ac:spMkLst>
+        </pc:spChg>
+      </pc:sldChg>
+      <pc:sldChg chg="addSp delSp modSp add mod">
+        <pc:chgData name="Ihor Aleksandrov" userId="c3051032-6b87-4db2-b257-777a0106fbd9" providerId="ADAL" clId="{D05EAF56-C8F0-4612-806C-93E1C27F1929}" dt="2024-01-25T11:55:41.171" v="279" actId="1076"/>
+        <pc:sldMkLst>
+          <pc:docMk/>
+          <pc:sldMk cId="2059493005" sldId="293"/>
+        </pc:sldMkLst>
+        <pc:spChg chg="mod">
+          <ac:chgData name="Ihor Aleksandrov" userId="c3051032-6b87-4db2-b257-777a0106fbd9" providerId="ADAL" clId="{D05EAF56-C8F0-4612-806C-93E1C27F1929}" dt="2024-01-25T11:55:19.618" v="271"/>
+          <ac:spMkLst>
+            <pc:docMk/>
+            <pc:sldMk cId="2059493005" sldId="293"/>
+            <ac:spMk id="2" creationId="{53C5D828-9666-E312-B574-9FE965A7D6BE}"/>
+          </ac:spMkLst>
+        </pc:spChg>
+        <pc:spChg chg="del">
+          <ac:chgData name="Ihor Aleksandrov" userId="c3051032-6b87-4db2-b257-777a0106fbd9" providerId="ADAL" clId="{D05EAF56-C8F0-4612-806C-93E1C27F1929}" dt="2024-01-25T11:55:21.950" v="272" actId="478"/>
+          <ac:spMkLst>
+            <pc:docMk/>
+            <pc:sldMk cId="2059493005" sldId="293"/>
+            <ac:spMk id="6" creationId="{E04F08BD-B70E-B1A8-7328-EE29B18E4AA1}"/>
+          </ac:spMkLst>
+        </pc:spChg>
+        <pc:picChg chg="add mod">
+          <ac:chgData name="Ihor Aleksandrov" userId="c3051032-6b87-4db2-b257-777a0106fbd9" providerId="ADAL" clId="{D05EAF56-C8F0-4612-806C-93E1C27F1929}" dt="2024-01-25T11:55:41.171" v="279" actId="1076"/>
+          <ac:picMkLst>
+            <pc:docMk/>
+            <pc:sldMk cId="2059493005" sldId="293"/>
+            <ac:picMk id="4" creationId="{B4989CAB-F181-BB13-C3CC-7303FC972C04}"/>
+          </ac:picMkLst>
+        </pc:picChg>
+      </pc:sldChg>
+      <pc:sldChg chg="addSp delSp modSp add mod">
+        <pc:chgData name="Ihor Aleksandrov" userId="c3051032-6b87-4db2-b257-777a0106fbd9" providerId="ADAL" clId="{D05EAF56-C8F0-4612-806C-93E1C27F1929}" dt="2024-01-25T11:57:16.812" v="286" actId="1076"/>
+        <pc:sldMkLst>
+          <pc:docMk/>
+          <pc:sldMk cId="1734173143" sldId="294"/>
+        </pc:sldMkLst>
+        <pc:spChg chg="mod">
+          <ac:chgData name="Ihor Aleksandrov" userId="c3051032-6b87-4db2-b257-777a0106fbd9" providerId="ADAL" clId="{D05EAF56-C8F0-4612-806C-93E1C27F1929}" dt="2024-01-25T11:56:59.706" v="281"/>
+          <ac:spMkLst>
+            <pc:docMk/>
+            <pc:sldMk cId="1734173143" sldId="294"/>
+            <ac:spMk id="2" creationId="{53C5D828-9666-E312-B574-9FE965A7D6BE}"/>
+          </ac:spMkLst>
+        </pc:spChg>
+        <pc:picChg chg="del">
+          <ac:chgData name="Ihor Aleksandrov" userId="c3051032-6b87-4db2-b257-777a0106fbd9" providerId="ADAL" clId="{D05EAF56-C8F0-4612-806C-93E1C27F1929}" dt="2024-01-25T11:57:02.563" v="282" actId="478"/>
+          <ac:picMkLst>
+            <pc:docMk/>
+            <pc:sldMk cId="1734173143" sldId="294"/>
+            <ac:picMk id="4" creationId="{B4989CAB-F181-BB13-C3CC-7303FC972C04}"/>
+          </ac:picMkLst>
+        </pc:picChg>
+        <pc:picChg chg="add mod">
+          <ac:chgData name="Ihor Aleksandrov" userId="c3051032-6b87-4db2-b257-777a0106fbd9" providerId="ADAL" clId="{D05EAF56-C8F0-4612-806C-93E1C27F1929}" dt="2024-01-25T11:57:16.812" v="286" actId="1076"/>
+          <ac:picMkLst>
+            <pc:docMk/>
+            <pc:sldMk cId="1734173143" sldId="294"/>
+            <ac:picMk id="5" creationId="{EFB4AF76-9D94-7721-E2C8-2472D164A060}"/>
+          </ac:picMkLst>
+        </pc:picChg>
+      </pc:sldChg>
+      <pc:sldChg chg="addSp modSp add mod ord">
+        <pc:chgData name="Ihor Aleksandrov" userId="c3051032-6b87-4db2-b257-777a0106fbd9" providerId="ADAL" clId="{D05EAF56-C8F0-4612-806C-93E1C27F1929}" dt="2024-01-25T12:00:46.169" v="306" actId="1076"/>
+        <pc:sldMkLst>
+          <pc:docMk/>
+          <pc:sldMk cId="3102755718" sldId="295"/>
+        </pc:sldMkLst>
+        <pc:spChg chg="mod">
+          <ac:chgData name="Ihor Aleksandrov" userId="c3051032-6b87-4db2-b257-777a0106fbd9" providerId="ADAL" clId="{D05EAF56-C8F0-4612-806C-93E1C27F1929}" dt="2024-01-25T12:00:14.709" v="300" actId="20577"/>
+          <ac:spMkLst>
+            <pc:docMk/>
+            <pc:sldMk cId="3102755718" sldId="295"/>
+            <ac:spMk id="2" creationId="{18C18207-A109-5552-1541-0ABBAA316282}"/>
+          </ac:spMkLst>
+        </pc:spChg>
+        <pc:picChg chg="add mod">
+          <ac:chgData name="Ihor Aleksandrov" userId="c3051032-6b87-4db2-b257-777a0106fbd9" providerId="ADAL" clId="{D05EAF56-C8F0-4612-806C-93E1C27F1929}" dt="2024-01-25T12:00:46.169" v="306" actId="1076"/>
+          <ac:picMkLst>
+            <pc:docMk/>
+            <pc:sldMk cId="3102755718" sldId="295"/>
+            <ac:picMk id="5" creationId="{BD0CE974-8524-11E7-B97F-A86834867985}"/>
+          </ac:picMkLst>
+        </pc:picChg>
+      </pc:sldChg>
+      <pc:sldChg chg="modSp add mod ord">
+        <pc:chgData name="Ihor Aleksandrov" userId="c3051032-6b87-4db2-b257-777a0106fbd9" providerId="ADAL" clId="{D05EAF56-C8F0-4612-806C-93E1C27F1929}" dt="2024-01-25T12:02:45.112" v="310"/>
+        <pc:sldMkLst>
+          <pc:docMk/>
+          <pc:sldMk cId="2389832786" sldId="296"/>
+        </pc:sldMkLst>
+        <pc:spChg chg="mod">
+          <ac:chgData name="Ihor Aleksandrov" userId="c3051032-6b87-4db2-b257-777a0106fbd9" providerId="ADAL" clId="{D05EAF56-C8F0-4612-806C-93E1C27F1929}" dt="2024-01-25T12:02:45.112" v="310"/>
+          <ac:spMkLst>
+            <pc:docMk/>
+            <pc:sldMk cId="2389832786" sldId="296"/>
+            <ac:spMk id="2" creationId="{53C5D828-9666-E312-B574-9FE965A7D6BE}"/>
+          </ac:spMkLst>
+        </pc:spChg>
+      </pc:sldChg>
+      <pc:sldChg chg="modSp add mod">
+        <pc:chgData name="Ihor Aleksandrov" userId="c3051032-6b87-4db2-b257-777a0106fbd9" providerId="ADAL" clId="{D05EAF56-C8F0-4612-806C-93E1C27F1929}" dt="2024-01-25T12:04:01.736" v="312"/>
+        <pc:sldMkLst>
+          <pc:docMk/>
+          <pc:sldMk cId="2189799752" sldId="297"/>
+        </pc:sldMkLst>
+        <pc:spChg chg="mod">
+          <ac:chgData name="Ihor Aleksandrov" userId="c3051032-6b87-4db2-b257-777a0106fbd9" providerId="ADAL" clId="{D05EAF56-C8F0-4612-806C-93E1C27F1929}" dt="2024-01-25T12:04:01.736" v="312"/>
+          <ac:spMkLst>
+            <pc:docMk/>
+            <pc:sldMk cId="2189799752" sldId="297"/>
+            <ac:spMk id="2" creationId="{53C5D828-9666-E312-B574-9FE965A7D6BE}"/>
+          </ac:spMkLst>
+        </pc:spChg>
+      </pc:sldChg>
+      <pc:sldChg chg="modSp add mod">
+        <pc:chgData name="Ihor Aleksandrov" userId="c3051032-6b87-4db2-b257-777a0106fbd9" providerId="ADAL" clId="{D05EAF56-C8F0-4612-806C-93E1C27F1929}" dt="2024-01-25T12:05:00.878" v="314"/>
+        <pc:sldMkLst>
+          <pc:docMk/>
+          <pc:sldMk cId="3592285454" sldId="298"/>
+        </pc:sldMkLst>
+        <pc:spChg chg="mod">
+          <ac:chgData name="Ihor Aleksandrov" userId="c3051032-6b87-4db2-b257-777a0106fbd9" providerId="ADAL" clId="{D05EAF56-C8F0-4612-806C-93E1C27F1929}" dt="2024-01-25T12:05:00.878" v="314"/>
+          <ac:spMkLst>
+            <pc:docMk/>
+            <pc:sldMk cId="3592285454" sldId="298"/>
+            <ac:spMk id="2" creationId="{53C5D828-9666-E312-B574-9FE965A7D6BE}"/>
+          </ac:spMkLst>
+        </pc:spChg>
+      </pc:sldChg>
+      <pc:sldChg chg="modSp add mod">
+        <pc:chgData name="Ihor Aleksandrov" userId="c3051032-6b87-4db2-b257-777a0106fbd9" providerId="ADAL" clId="{D05EAF56-C8F0-4612-806C-93E1C27F1929}" dt="2024-01-25T12:08:02.278" v="316"/>
+        <pc:sldMkLst>
+          <pc:docMk/>
+          <pc:sldMk cId="4186553512" sldId="299"/>
+        </pc:sldMkLst>
+        <pc:spChg chg="mod">
+          <ac:chgData name="Ihor Aleksandrov" userId="c3051032-6b87-4db2-b257-777a0106fbd9" providerId="ADAL" clId="{D05EAF56-C8F0-4612-806C-93E1C27F1929}" dt="2024-01-25T12:08:02.278" v="316"/>
+          <ac:spMkLst>
+            <pc:docMk/>
+            <pc:sldMk cId="4186553512" sldId="299"/>
+            <ac:spMk id="2" creationId="{53C5D828-9666-E312-B574-9FE965A7D6BE}"/>
+          </ac:spMkLst>
+        </pc:spChg>
+      </pc:sldChg>
+      <pc:sldChg chg="modSp add mod">
+        <pc:chgData name="Ihor Aleksandrov" userId="c3051032-6b87-4db2-b257-777a0106fbd9" providerId="ADAL" clId="{D05EAF56-C8F0-4612-806C-93E1C27F1929}" dt="2024-01-25T12:09:53.445" v="318"/>
+        <pc:sldMkLst>
+          <pc:docMk/>
+          <pc:sldMk cId="834159653" sldId="300"/>
+        </pc:sldMkLst>
+        <pc:spChg chg="mod">
+          <ac:chgData name="Ihor Aleksandrov" userId="c3051032-6b87-4db2-b257-777a0106fbd9" providerId="ADAL" clId="{D05EAF56-C8F0-4612-806C-93E1C27F1929}" dt="2024-01-25T12:09:53.445" v="318"/>
+          <ac:spMkLst>
+            <pc:docMk/>
+            <pc:sldMk cId="834159653" sldId="300"/>
+            <ac:spMk id="2" creationId="{53C5D828-9666-E312-B574-9FE965A7D6BE}"/>
+          </ac:spMkLst>
+        </pc:spChg>
+      </pc:sldChg>
+      <pc:sldChg chg="modSp add mod">
+        <pc:chgData name="Ihor Aleksandrov" userId="c3051032-6b87-4db2-b257-777a0106fbd9" providerId="ADAL" clId="{D05EAF56-C8F0-4612-806C-93E1C27F1929}" dt="2024-01-25T12:10:57.045" v="321" actId="27636"/>
+        <pc:sldMkLst>
+          <pc:docMk/>
+          <pc:sldMk cId="324410250" sldId="301"/>
+        </pc:sldMkLst>
+        <pc:spChg chg="mod">
+          <ac:chgData name="Ihor Aleksandrov" userId="c3051032-6b87-4db2-b257-777a0106fbd9" providerId="ADAL" clId="{D05EAF56-C8F0-4612-806C-93E1C27F1929}" dt="2024-01-25T12:10:57.045" v="321" actId="27636"/>
+          <ac:spMkLst>
+            <pc:docMk/>
+            <pc:sldMk cId="324410250" sldId="301"/>
+            <ac:spMk id="2" creationId="{53C5D828-9666-E312-B574-9FE965A7D6BE}"/>
+          </ac:spMkLst>
+        </pc:spChg>
+      </pc:sldChg>
+      <pc:sldChg chg="add">
+        <pc:chgData name="Ihor Aleksandrov" userId="c3051032-6b87-4db2-b257-777a0106fbd9" providerId="ADAL" clId="{D05EAF56-C8F0-4612-806C-93E1C27F1929}" dt="2024-01-25T12:18:40.426" v="323"/>
+        <pc:sldMkLst>
+          <pc:docMk/>
+          <pc:sldMk cId="2052164358" sldId="302"/>
+        </pc:sldMkLst>
+      </pc:sldChg>
+      <pc:sldChg chg="add">
+        <pc:chgData name="Ihor Aleksandrov" userId="c3051032-6b87-4db2-b257-777a0106fbd9" providerId="ADAL" clId="{D05EAF56-C8F0-4612-806C-93E1C27F1929}" dt="2024-01-25T12:18:42.706" v="325"/>
+        <pc:sldMkLst>
+          <pc:docMk/>
+          <pc:sldMk cId="2972731808" sldId="303"/>
+        </pc:sldMkLst>
+      </pc:sldChg>
+      <pc:sldMasterChg chg="add addSldLayout">
+        <pc:chgData name="Ihor Aleksandrov" userId="c3051032-6b87-4db2-b257-777a0106fbd9" providerId="ADAL" clId="{D05EAF56-C8F0-4612-806C-93E1C27F1929}" dt="2024-01-25T12:18:42.701" v="324" actId="27028"/>
+        <pc:sldMasterMkLst>
+          <pc:docMk/>
+          <pc:sldMasterMk cId="1185679814" sldId="2147483648"/>
+        </pc:sldMasterMkLst>
+        <pc:sldLayoutChg chg="add">
+          <pc:chgData name="Ihor Aleksandrov" userId="c3051032-6b87-4db2-b257-777a0106fbd9" providerId="ADAL" clId="{D05EAF56-C8F0-4612-806C-93E1C27F1929}" dt="2024-01-25T12:18:40.421" v="322" actId="27028"/>
+          <pc:sldLayoutMkLst>
+            <pc:docMk/>
+            <pc:sldMasterMk cId="1185679814" sldId="2147483648"/>
+            <pc:sldLayoutMk cId="2257280135" sldId="2147483649"/>
+          </pc:sldLayoutMkLst>
+        </pc:sldLayoutChg>
+        <pc:sldLayoutChg chg="add">
+          <pc:chgData name="Ihor Aleksandrov" userId="c3051032-6b87-4db2-b257-777a0106fbd9" providerId="ADAL" clId="{D05EAF56-C8F0-4612-806C-93E1C27F1929}" dt="2024-01-25T12:18:42.701" v="324" actId="27028"/>
+          <pc:sldLayoutMkLst>
+            <pc:docMk/>
+            <pc:sldMasterMk cId="1185679814" sldId="2147483648"/>
+            <pc:sldLayoutMk cId="1044916995" sldId="2147483650"/>
+          </pc:sldLayoutMkLst>
+        </pc:sldLayoutChg>
+      </pc:sldMasterChg>
     </pc:docChg>
   </pc:docChgLst>
 </pc:chgInfo>
@@ -4232,7 +4232,7 @@
           <a:p>
             <a:fld id="{14FB1113-EC1E-4052-ADC3-711A8186C8F9}" type="datetimeFigureOut">
               <a:rPr lang="ru-UA" smtClean="0"/>
-              <a:t>25.01.2024</a:t>
+              <a:t>26.01.2024</a:t>
             </a:fld>
             <a:endParaRPr lang="ru-UA"/>
           </a:p>
@@ -4649,7 +4649,7 @@
           <a:p>
             <a:fld id="{0B8962EF-F649-4BF0-B0CB-D71423952154}" type="datetime1">
               <a:rPr lang="ru-UA" smtClean="0"/>
-              <a:t>25.01.2024</a:t>
+              <a:t>26.01.2024</a:t>
             </a:fld>
             <a:endParaRPr lang="ru-UA"/>
           </a:p>
@@ -4853,7 +4853,7 @@
           <a:p>
             <a:fld id="{52B04991-4203-48C2-B120-290746D8BC41}" type="datetime1">
               <a:rPr lang="ru-UA" smtClean="0"/>
-              <a:t>25.01.2024</a:t>
+              <a:t>26.01.2024</a:t>
             </a:fld>
             <a:endParaRPr lang="ru-UA"/>
           </a:p>
@@ -5067,7 +5067,7 @@
           <a:p>
             <a:fld id="{207AB121-CB86-4DCF-9E3D-2A0553392796}" type="datetime1">
               <a:rPr lang="ru-UA" smtClean="0"/>
-              <a:t>25.01.2024</a:t>
+              <a:t>26.01.2024</a:t>
             </a:fld>
             <a:endParaRPr lang="ru-UA"/>
           </a:p>
@@ -5271,7 +5271,7 @@
           <a:p>
             <a:fld id="{8467C913-2051-48A1-86F2-D1DABB2E6F13}" type="datetime1">
               <a:rPr lang="ru-UA" smtClean="0"/>
-              <a:t>25.01.2024</a:t>
+              <a:t>26.01.2024</a:t>
             </a:fld>
             <a:endParaRPr lang="ru-UA"/>
           </a:p>
@@ -5497,7 +5497,7 @@
           <a:p>
             <a:fld id="{C75B975F-BA21-4E1C-99B6-ABED30F89540}" type="datetime1">
               <a:rPr lang="ru-UA" smtClean="0"/>
-              <a:t>25.01.2024</a:t>
+              <a:t>26.01.2024</a:t>
             </a:fld>
             <a:endParaRPr lang="ru-UA"/>
           </a:p>
@@ -5701,7 +5701,7 @@
           <a:p>
             <a:fld id="{649A85F2-FE43-4F23-9D2D-558360D289A8}" type="datetime1">
               <a:rPr lang="ru-UA" smtClean="0"/>
-              <a:t>25.01.2024</a:t>
+              <a:t>26.01.2024</a:t>
             </a:fld>
             <a:endParaRPr lang="ru-UA"/>
           </a:p>
@@ -5981,7 +5981,7 @@
           <a:p>
             <a:fld id="{3C823F1E-25D4-4C19-9C16-57D27B598CE0}" type="datetime1">
               <a:rPr lang="ru-UA" smtClean="0"/>
-              <a:t>25.01.2024</a:t>
+              <a:t>26.01.2024</a:t>
             </a:fld>
             <a:endParaRPr lang="ru-UA"/>
           </a:p>
@@ -6253,7 +6253,7 @@
           <a:p>
             <a:fld id="{0FCE2DAB-FCC6-443D-91B5-F43A7B78C6B9}" type="datetime1">
               <a:rPr lang="ru-UA" smtClean="0"/>
-              <a:t>25.01.2024</a:t>
+              <a:t>26.01.2024</a:t>
             </a:fld>
             <a:endParaRPr lang="ru-UA"/>
           </a:p>
@@ -6672,7 +6672,7 @@
           <a:p>
             <a:fld id="{B647925C-949E-4C3F-B87F-94A502A4557F}" type="datetime1">
               <a:rPr lang="ru-UA" smtClean="0"/>
-              <a:t>25.01.2024</a:t>
+              <a:t>26.01.2024</a:t>
             </a:fld>
             <a:endParaRPr lang="ru-UA"/>
           </a:p>
@@ -6818,7 +6818,7 @@
           <a:p>
             <a:fld id="{9CE8CD01-0F29-4954-897C-1CC212183DBB}" type="datetime1">
               <a:rPr lang="ru-UA" smtClean="0"/>
-              <a:t>25.01.2024</a:t>
+              <a:t>26.01.2024</a:t>
             </a:fld>
             <a:endParaRPr lang="ru-UA"/>
           </a:p>
@@ -6935,7 +6935,7 @@
           <a:p>
             <a:fld id="{150095DC-0E76-47E5-A99D-2467BE30280E}" type="datetime1">
               <a:rPr lang="ru-UA" smtClean="0"/>
-              <a:t>25.01.2024</a:t>
+              <a:t>26.01.2024</a:t>
             </a:fld>
             <a:endParaRPr lang="ru-UA"/>
           </a:p>
@@ -7252,7 +7252,7 @@
           <a:p>
             <a:fld id="{CC7126BF-809C-4659-95F5-CCF148063973}" type="datetime1">
               <a:rPr lang="ru-UA" smtClean="0"/>
-              <a:t>25.01.2024</a:t>
+              <a:t>26.01.2024</a:t>
             </a:fld>
             <a:endParaRPr lang="ru-UA"/>
           </a:p>
@@ -7545,7 +7545,7 @@
           <a:p>
             <a:fld id="{D2EFC65D-56A3-455E-BFA5-3848A656380B}" type="datetime1">
               <a:rPr lang="ru-UA" smtClean="0"/>
-              <a:t>25.01.2024</a:t>
+              <a:t>26.01.2024</a:t>
             </a:fld>
             <a:endParaRPr lang="ru-UA"/>
           </a:p>
@@ -7792,7 +7792,7 @@
           <a:p>
             <a:fld id="{5E1B79E6-2B08-45F0-89F7-F914E581FDE2}" type="datetime1">
               <a:rPr lang="ru-UA" smtClean="0"/>
-              <a:t>25.01.2024</a:t>
+              <a:t>26.01.2024</a:t>
             </a:fld>
             <a:endParaRPr lang="ru-UA"/>
           </a:p>
@@ -8367,7 +8367,7 @@
           <a:p>
             <a:fld id="{50344D1B-5235-486F-A999-CD74520911B6}" type="datetime1">
               <a:rPr lang="ru-UA" smtClean="0"/>
-              <a:t>25.01.2024</a:t>
+              <a:t>26.01.2024</a:t>
             </a:fld>
             <a:endParaRPr lang="ru-UA"/>
           </a:p>
@@ -8966,39 +8966,6 @@
       </p:sp>
       <p:sp>
         <p:nvSpPr>
-          <p:cNvPr id="3" name="Subtitle 2">
-            <a:extLst>
-              <a:ext uri="{FF2B5EF4-FFF2-40B4-BE49-F238E27FC236}">
-                <a16:creationId xmlns:a16="http://schemas.microsoft.com/office/drawing/2014/main" id="{CC0591DF-C2F9-838D-FBD9-6ECAF8229E69}"/>
-              </a:ext>
-            </a:extLst>
-          </p:cNvPr>
-          <p:cNvSpPr>
-            <a:spLocks noGrp="1"/>
-          </p:cNvSpPr>
-          <p:nvPr>
-            <p:ph type="subTitle" idx="1"/>
-          </p:nvPr>
-        </p:nvSpPr>
-        <p:spPr>
-          <a:xfrm>
-            <a:off x="1155558" y="4307684"/>
-            <a:ext cx="9544153" cy="1906846"/>
-          </a:xfrm>
-        </p:spPr>
-        <p:txBody>
-          <a:bodyPr anchor="t">
-            <a:normAutofit/>
-          </a:bodyPr>
-          <a:lstStyle/>
-          <a:p>
-            <a:pPr algn="l"/>
-            <a:endParaRPr lang="ru-UA" sz="3200"/>
-          </a:p>
-        </p:txBody>
-      </p:sp>
-      <p:sp>
-        <p:nvSpPr>
           <p:cNvPr id="13" name="Rectangle 12">
             <a:extLst>
               <a:ext uri="{FF2B5EF4-FFF2-40B4-BE49-F238E27FC236}">
@@ -9676,39 +9643,6 @@
           <a:p>
             <a:pPr algn="ctr"/>
             <a:endParaRPr lang="en-US"/>
-          </a:p>
-        </p:txBody>
-      </p:sp>
-      <p:sp>
-        <p:nvSpPr>
-          <p:cNvPr id="3" name="Subtitle 2">
-            <a:extLst>
-              <a:ext uri="{FF2B5EF4-FFF2-40B4-BE49-F238E27FC236}">
-                <a16:creationId xmlns:a16="http://schemas.microsoft.com/office/drawing/2014/main" id="{3473E1D3-7401-AD94-5C7A-49912FA8005A}"/>
-              </a:ext>
-            </a:extLst>
-          </p:cNvPr>
-          <p:cNvSpPr>
-            <a:spLocks noGrp="1"/>
-          </p:cNvSpPr>
-          <p:nvPr>
-            <p:ph type="subTitle" idx="1"/>
-          </p:nvPr>
-        </p:nvSpPr>
-        <p:spPr>
-          <a:xfrm>
-            <a:off x="6739464" y="637762"/>
-            <a:ext cx="4305881" cy="5860946"/>
-          </a:xfrm>
-        </p:spPr>
-        <p:txBody>
-          <a:bodyPr anchor="ctr">
-            <a:normAutofit/>
-          </a:bodyPr>
-          <a:lstStyle/>
-          <a:p>
-            <a:pPr algn="l"/>
-            <a:endParaRPr lang="ru-UA" sz="4000"/>
           </a:p>
         </p:txBody>
       </p:sp>

</xml_diff>